<commit_message>
Made Fib seq into array for simpler generation
</commit_message>
<xml_diff>
--- a/pptx/Slides.pptx
+++ b/pptx/Slides.pptx
@@ -10,6 +10,7 @@
     <p:sldId id="258" r:id="rId10"/>
     <p:sldId id="259" r:id="rId11"/>
     <p:sldId id="260" r:id="rId12"/>
+    <p:sldId id="261" r:id="rId13"/>
   </p:sldIdLst>
   <p:sldSz cx="18288000" cy="10287000" type="screen4x3"/>
   <p:notesSz cx="6858000" cy="9144000"/>
@@ -726,6 +727,72 @@
 </file>
 
 <file path=ppt/notesSlides/notesSlide5.xml><?xml version="1.0" encoding="utf-8"?>
+<p:notes xmlns:a="http://schemas.openxmlformats.org/drawingml/2006/main" xmlns:p="http://schemas.openxmlformats.org/presentationml/2006/main" xmlns:r="http://schemas.openxmlformats.org/officeDocument/2006/relationships">
+  <p:cSld>
+    <p:spTree>
+      <p:nvGrpSpPr>
+        <p:cNvPr id="1" name=""/>
+        <p:cNvGrpSpPr/>
+        <p:nvPr/>
+      </p:nvGrpSpPr>
+      <p:grpSpPr>
+        <a:xfrm>
+          <a:off x="0" y="0"/>
+          <a:ext cx="0" cy="0"/>
+          <a:chOff x="0" y="0"/>
+          <a:chExt cx="0" cy="0"/>
+        </a:xfrm>
+      </p:grpSpPr>
+      <p:sp>
+        <p:nvSpPr>
+          <p:cNvPr id="2" name="Slide Image Placeholder 1"/>
+          <p:cNvSpPr>
+            <a:spLocks noGrp="1"/>
+          </p:cNvSpPr>
+          <p:nvPr>
+            <p:ph type="sldImg" idx="2"/>
+          </p:nvPr>
+        </p:nvSpPr>
+        <p:spPr/>
+      </p:sp>
+      <p:sp>
+        <p:nvSpPr>
+          <p:cNvPr id="3" name="Notes Placeholder 2"/>
+          <p:cNvSpPr>
+            <a:spLocks noGrp="1"/>
+          </p:cNvSpPr>
+          <p:nvPr>
+            <p:ph type="body" idx="3" sz="quarter"/>
+          </p:nvPr>
+        </p:nvSpPr>
+        <p:spPr/>
+        <p:txBody>
+          <a:bodyPr/>
+          <a:lstStyle/>
+          <a:p/>
+        </p:txBody>
+      </p:sp>
+      <p:sp>
+        <p:nvSpPr>
+          <p:cNvPr id="4" name="Slide Number Placeholder 3"/>
+          <p:cNvSpPr>
+            <a:spLocks noGrp="1"/>
+          </p:cNvSpPr>
+          <p:nvPr>
+            <p:ph type="sldNum" idx="5" sz="quarter"/>
+          </p:nvPr>
+        </p:nvSpPr>
+        <p:spPr/>
+      </p:sp>
+    </p:spTree>
+  </p:cSld>
+  <p:clrMapOvr>
+    <a:masterClrMapping/>
+  </p:clrMapOvr>
+</p:notes>
+</file>
+
+<file path=ppt/notesSlides/notesSlide6.xml><?xml version="1.0" encoding="utf-8"?>
 <p:notes xmlns:a="http://schemas.openxmlformats.org/drawingml/2006/main" xmlns:p="http://schemas.openxmlformats.org/presentationml/2006/main" xmlns:r="http://schemas.openxmlformats.org/officeDocument/2006/relationships">
   <p:cSld>
     <p:spTree>
@@ -4108,7 +4175,7 @@
       <p:grpSpPr/>
       <p:pic>
         <p:nvPicPr>
-          <p:cNvPr id="2" name="34786186_1557261270_3780824801.mp4">
+          <p:cNvPr id="2" name="34786186_3211008411_3751238116.mp4">
             <a:hlinkClick r:id="" action="ppaction://media"/>
           </p:cNvPr>
           <p:cNvPicPr>
@@ -4275,7 +4342,7 @@
       <p:grpSpPr/>
       <p:pic>
         <p:nvPicPr>
-          <p:cNvPr id="2" name="34786186_2565420408_857614352.mp4">
+          <p:cNvPr id="2" name="34786186_1420726102_4152153373.mp4">
             <a:hlinkClick r:id="" action="ppaction://media"/>
           </p:cNvPr>
           <p:cNvPicPr>
@@ -4308,7 +4375,7 @@
       </p:pic>
       <p:pic>
         <p:nvPicPr>
-          <p:cNvPr id="3" name="34786186_759373122_2952370864.mp4">
+          <p:cNvPr id="3" name="34786186_1492757240_2486132252.mp4">
             <a:hlinkClick r:id="" action="ppaction://media"/>
           </p:cNvPr>
           <p:cNvPicPr>
@@ -4597,7 +4664,329 @@
       <p:grpSpPr/>
       <p:pic>
         <p:nvPicPr>
-          <p:cNvPr id="2" name="34786186_2400270203_2063361248.mp4">
+          <p:cNvPr id="2" name="34786186_2696675387_3773411577.mp4">
+            <a:hlinkClick r:id="" action="ppaction://media"/>
+          </p:cNvPr>
+          <p:cNvPicPr>
+            <a:picLocks noChangeAspect="1"/>
+          </p:cNvPicPr>
+          <p:nvPr>
+            <a:videoFile r:link="rId4"/>
+            <p:extLst>
+              <p:ext uri="{DAA4B4D4-6D71-4841-9C94-3DE7FCFB9230}">
+                <p14:media xmlns:p14="http://schemas.microsoft.com/office/powerpoint/2010/main" r:embed="rId3"/>
+              </p:ext>
+            </p:extLst>
+          </p:nvPr>
+        </p:nvPicPr>
+        <p:blipFill>
+          <a:blip r:embed="rId5"/>
+          <a:stretch>
+            <a:fillRect/>
+          </a:stretch>
+        </p:blipFill>
+        <p:spPr>
+          <a:xfrm>
+            <a:off x="0" y="0"/>
+            <a:ext cx="18288000" cy="10287000"/>
+          </a:xfrm>
+          <a:prstGeom prst="rect">
+            <a:avLst/>
+          </a:prstGeom>
+        </p:spPr>
+      </p:pic>
+      <p:pic>
+        <p:nvPicPr>
+          <p:cNvPr id="3" name="34786186_1118075671_21488921.mp4">
+            <a:hlinkClick r:id="" action="ppaction://media"/>
+          </p:cNvPr>
+          <p:cNvPicPr>
+            <a:picLocks noChangeAspect="1"/>
+          </p:cNvPicPr>
+          <p:nvPr>
+            <a:videoFile r:link="rId7"/>
+            <p:extLst>
+              <p:ext uri="{DAA4B4D4-6D71-4841-9C94-3DE7FCFB9230}">
+                <p14:media xmlns:p14="http://schemas.microsoft.com/office/powerpoint/2010/main" r:embed="rId6"/>
+              </p:ext>
+            </p:extLst>
+          </p:nvPr>
+        </p:nvPicPr>
+        <p:blipFill>
+          <a:blip r:embed="rId8"/>
+          <a:stretch>
+            <a:fillRect/>
+          </a:stretch>
+        </p:blipFill>
+        <p:spPr>
+          <a:xfrm>
+            <a:off x="0" y="0"/>
+            <a:ext cx="18288000" cy="10287000"/>
+          </a:xfrm>
+          <a:prstGeom prst="rect">
+            <a:avLst/>
+          </a:prstGeom>
+        </p:spPr>
+      </p:pic>
+    </p:spTree>
+  </p:cSld>
+  <p:clrMapOvr>
+    <a:masterClrMapping/>
+  </p:clrMapOvr>
+  <p:timing>
+    <p:tnLst>
+      <p:par>
+        <p:cTn id="1" dur="indefinite" restart="never" nodeType="tmRoot">
+          <p:childTnLst>
+            <p:seq concurrent="1" nextAc="seek">
+              <p:cTn id="2" dur="indefinite" nodeType="mainSeq">
+                <p:childTnLst>
+                  <p:par>
+                    <p:cTn id="3" fill="hold">
+                      <p:stCondLst>
+                        <p:cond delay="indefinite"/>
+                        <p:cond evt="onBegin" delay="0">
+                          <p:tn val="2"/>
+                        </p:cond>
+                      </p:stCondLst>
+                      <p:childTnLst>
+                        <p:par>
+                          <p:cTn id="4" fill="hold">
+                            <p:stCondLst>
+                              <p:cond delay="0"/>
+                            </p:stCondLst>
+                            <p:childTnLst>
+                              <p:par>
+                                <p:cTn id="5" presetID="1" presetClass="entr" presetSubtype="0" fill="hold" nodeType="withEffect">
+                                  <p:stCondLst>
+                                    <p:cond delay="0"/>
+                                  </p:stCondLst>
+                                  <p:childTnLst>
+                                    <p:set>
+                                      <p:cBhvr>
+                                        <p:cTn id="6" dur="1" fill="hold">
+                                          <p:stCondLst>
+                                            <p:cond delay="0"/>
+                                          </p:stCondLst>
+                                        </p:cTn>
+                                        <p:tgtEl>
+                                          <p:spTgt spid="2"/>
+                                        </p:tgtEl>
+                                        <p:attrNameLst>
+                                          <p:attrName>style.visibility</p:attrName>
+                                        </p:attrNameLst>
+                                      </p:cBhvr>
+                                      <p:to>
+                                        <p:strVal val="visible"/>
+                                      </p:to>
+                                    </p:set>
+                                  </p:childTnLst>
+                                </p:cTn>
+                              </p:par>
+                            </p:childTnLst>
+                          </p:cTn>
+                        </p:par>
+                        <p:par>
+                          <p:cTn id="7" fill="hold">
+                            <p:stCondLst>
+                              <p:cond delay="0"/>
+                            </p:stCondLst>
+                            <p:childTnLst>
+                              <p:par>
+                                <p:cTn id="8" presetID="1" presetClass="mediacall" presetSubtype="0" fill="hold" nodeType="afterEffect">
+                                  <p:stCondLst>
+                                    <p:cond delay="0"/>
+                                  </p:stCondLst>
+                                  <p:childTnLst>
+                                    <p:cmd type="call" cmd="playFrom(0.0)">
+                                      <p:cBhvr>
+                                        <p:cTn id="9" dur="1000" fill="hold"/>
+                                        <p:tgtEl>
+                                          <p:spTgt spid="2"/>
+                                        </p:tgtEl>
+                                      </p:cBhvr>
+                                    </p:cmd>
+                                  </p:childTnLst>
+                                </p:cTn>
+                              </p:par>
+                            </p:childTnLst>
+                          </p:cTn>
+                        </p:par>
+                        <p:par>
+                          <p:cTn id="10" fill="hold">
+                            <p:stCondLst>
+                              <p:cond delay="1000"/>
+                            </p:stCondLst>
+                            <p:childTnLst>
+                              <p:par>
+                                <p:cTn id="11" presetID="1" presetClass="exit" presetSubtype="0" fill="hold" nodeType="afterEffect">
+                                  <p:stCondLst>
+                                    <p:cond delay="0"/>
+                                  </p:stCondLst>
+                                  <p:childTnLst>
+                                    <p:set>
+                                      <p:cBhvr>
+                                        <p:cTn id="12" dur="1" fill="hold">
+                                          <p:stCondLst>
+                                            <p:cond delay="0"/>
+                                          </p:stCondLst>
+                                        </p:cTn>
+                                        <p:tgtEl>
+                                          <p:spTgt spid="2"/>
+                                        </p:tgtEl>
+                                        <p:attrNameLst>
+                                          <p:attrName>style.visibility</p:attrName>
+                                        </p:attrNameLst>
+                                      </p:cBhvr>
+                                      <p:to>
+                                        <p:strVal val="hidden"/>
+                                      </p:to>
+                                    </p:set>
+                                    <p:cmd type="call" cmd="stop">
+                                      <p:cBhvr>
+                                        <p:cTn id="13" dur="1" fill="hold">
+                                          <p:stCondLst>
+                                            <p:cond delay="0"/>
+                                          </p:stCondLst>
+                                        </p:cTn>
+                                        <p:tgtEl>
+                                          <p:spTgt spid="2"/>
+                                        </p:tgtEl>
+                                      </p:cBhvr>
+                                    </p:cmd>
+                                  </p:childTnLst>
+                                </p:cTn>
+                              </p:par>
+                            </p:childTnLst>
+                          </p:cTn>
+                        </p:par>
+                        <p:par>
+                          <p:cTn id="14" fill="hold">
+                            <p:stCondLst>
+                              <p:cond delay="1000"/>
+                            </p:stCondLst>
+                            <p:childTnLst>
+                              <p:par>
+                                <p:cTn id="15" presetID="1" presetClass="entr" presetSubtype="0" fill="hold" nodeType="afterEffect">
+                                  <p:stCondLst>
+                                    <p:cond delay="0"/>
+                                  </p:stCondLst>
+                                  <p:childTnLst>
+                                    <p:set>
+                                      <p:cBhvr>
+                                        <p:cTn id="16" dur="1" fill="hold">
+                                          <p:stCondLst>
+                                            <p:cond delay="0"/>
+                                          </p:stCondLst>
+                                        </p:cTn>
+                                        <p:tgtEl>
+                                          <p:spTgt spid="3"/>
+                                        </p:tgtEl>
+                                        <p:attrNameLst>
+                                          <p:attrName>style.visibility</p:attrName>
+                                        </p:attrNameLst>
+                                      </p:cBhvr>
+                                      <p:to>
+                                        <p:strVal val="visible"/>
+                                      </p:to>
+                                    </p:set>
+                                  </p:childTnLst>
+                                </p:cTn>
+                              </p:par>
+                            </p:childTnLst>
+                          </p:cTn>
+                        </p:par>
+                        <p:par>
+                          <p:cTn id="17" fill="hold">
+                            <p:stCondLst>
+                              <p:cond delay="1000"/>
+                            </p:stCondLst>
+                            <p:childTnLst>
+                              <p:par>
+                                <p:cTn id="18" presetID="1" presetClass="mediacall" presetSubtype="0" fill="hold" nodeType="afterEffect">
+                                  <p:stCondLst>
+                                    <p:cond delay="0"/>
+                                  </p:stCondLst>
+                                  <p:childTnLst>
+                                    <p:cmd type="call" cmd="playFrom(0.0)">
+                                      <p:cBhvr>
+                                        <p:cTn id="19" dur="1000" fill="hold"/>
+                                        <p:tgtEl>
+                                          <p:spTgt spid="3"/>
+                                        </p:tgtEl>
+                                      </p:cBhvr>
+                                    </p:cmd>
+                                  </p:childTnLst>
+                                </p:cTn>
+                              </p:par>
+                            </p:childTnLst>
+                          </p:cTn>
+                        </p:par>
+                      </p:childTnLst>
+                    </p:cTn>
+                  </p:par>
+                </p:childTnLst>
+              </p:cTn>
+              <p:prevCondLst>
+                <p:cond evt="onPrev" delay="0">
+                  <p:tgtEl>
+                    <p:sldTgt/>
+                  </p:tgtEl>
+                </p:cond>
+              </p:prevCondLst>
+              <p:nextCondLst>
+                <p:cond evt="onNext" delay="0">
+                  <p:tgtEl>
+                    <p:sldTgt/>
+                  </p:tgtEl>
+                </p:cond>
+              </p:nextCondLst>
+            </p:seq>
+            <p:video>
+              <p:cMediaNode vol="80000">
+                <p:cTn id="20" fill="hold" display="0">
+                  <p:stCondLst>
+                    <p:cond delay="indefinite"/>
+                  </p:stCondLst>
+                </p:cTn>
+                <p:tgtEl>
+                  <p:spTgt spid="2"/>
+                </p:tgtEl>
+              </p:cMediaNode>
+            </p:video>
+            <p:video>
+              <p:cMediaNode vol="80000">
+                <p:cTn id="21" fill="hold" display="0">
+                  <p:stCondLst>
+                    <p:cond delay="indefinite"/>
+                  </p:stCondLst>
+                </p:cTn>
+                <p:tgtEl>
+                  <p:spTgt spid="3"/>
+                </p:tgtEl>
+              </p:cMediaNode>
+            </p:video>
+          </p:childTnLst>
+        </p:cTn>
+      </p:par>
+    </p:tnLst>
+  </p:timing>
+</p:sld>
+</file>
+
+<file path=ppt/slides/slide6.xml><?xml version="1.0" encoding="utf-8"?>
+<p:sld xmlns:a="http://schemas.openxmlformats.org/drawingml/2006/main" xmlns:p="http://schemas.openxmlformats.org/presentationml/2006/main" xmlns:r="http://schemas.openxmlformats.org/officeDocument/2006/relationships">
+  <p:cSld>
+    <p:spTree>
+      <p:nvGrpSpPr>
+        <p:cNvPr id="1" name=""/>
+        <p:cNvGrpSpPr/>
+        <p:nvPr/>
+      </p:nvGrpSpPr>
+      <p:grpSpPr/>
+      <p:pic>
+        <p:nvPicPr>
+          <p:cNvPr id="2" name="34786186_2280684391_700406015.mp4">
             <a:hlinkClick r:id="" action="ppaction://media"/>
           </p:cNvPr>
           <p:cNvPicPr>

</xml_diff>

<commit_message>
working n generated brocot sequernce
</commit_message>
<xml_diff>
--- a/pptx/Slides.pptx
+++ b/pptx/Slides.pptx
@@ -11,6 +11,7 @@
     <p:sldId id="259" r:id="rId11"/>
     <p:sldId id="260" r:id="rId12"/>
     <p:sldId id="261" r:id="rId13"/>
+    <p:sldId id="262" r:id="rId14"/>
   </p:sldIdLst>
   <p:sldSz cx="18288000" cy="10287000" type="screen4x3"/>
   <p:notesSz cx="6858000" cy="9144000"/>
@@ -793,6 +794,72 @@
 </file>
 
 <file path=ppt/notesSlides/notesSlide6.xml><?xml version="1.0" encoding="utf-8"?>
+<p:notes xmlns:a="http://schemas.openxmlformats.org/drawingml/2006/main" xmlns:p="http://schemas.openxmlformats.org/presentationml/2006/main" xmlns:r="http://schemas.openxmlformats.org/officeDocument/2006/relationships">
+  <p:cSld>
+    <p:spTree>
+      <p:nvGrpSpPr>
+        <p:cNvPr id="1" name=""/>
+        <p:cNvGrpSpPr/>
+        <p:nvPr/>
+      </p:nvGrpSpPr>
+      <p:grpSpPr>
+        <a:xfrm>
+          <a:off x="0" y="0"/>
+          <a:ext cx="0" cy="0"/>
+          <a:chOff x="0" y="0"/>
+          <a:chExt cx="0" cy="0"/>
+        </a:xfrm>
+      </p:grpSpPr>
+      <p:sp>
+        <p:nvSpPr>
+          <p:cNvPr id="2" name="Slide Image Placeholder 1"/>
+          <p:cNvSpPr>
+            <a:spLocks noGrp="1"/>
+          </p:cNvSpPr>
+          <p:nvPr>
+            <p:ph type="sldImg" idx="2"/>
+          </p:nvPr>
+        </p:nvSpPr>
+        <p:spPr/>
+      </p:sp>
+      <p:sp>
+        <p:nvSpPr>
+          <p:cNvPr id="3" name="Notes Placeholder 2"/>
+          <p:cNvSpPr>
+            <a:spLocks noGrp="1"/>
+          </p:cNvSpPr>
+          <p:nvPr>
+            <p:ph type="body" idx="3" sz="quarter"/>
+          </p:nvPr>
+        </p:nvSpPr>
+        <p:spPr/>
+        <p:txBody>
+          <a:bodyPr/>
+          <a:lstStyle/>
+          <a:p/>
+        </p:txBody>
+      </p:sp>
+      <p:sp>
+        <p:nvSpPr>
+          <p:cNvPr id="4" name="Slide Number Placeholder 3"/>
+          <p:cNvSpPr>
+            <a:spLocks noGrp="1"/>
+          </p:cNvSpPr>
+          <p:nvPr>
+            <p:ph type="sldNum" idx="5" sz="quarter"/>
+          </p:nvPr>
+        </p:nvSpPr>
+        <p:spPr/>
+      </p:sp>
+    </p:spTree>
+  </p:cSld>
+  <p:clrMapOvr>
+    <a:masterClrMapping/>
+  </p:clrMapOvr>
+</p:notes>
+</file>
+
+<file path=ppt/notesSlides/notesSlide7.xml><?xml version="1.0" encoding="utf-8"?>
 <p:notes xmlns:a="http://schemas.openxmlformats.org/drawingml/2006/main" xmlns:p="http://schemas.openxmlformats.org/presentationml/2006/main" xmlns:r="http://schemas.openxmlformats.org/officeDocument/2006/relationships">
   <p:cSld>
     <p:spTree>
@@ -4175,7 +4242,7 @@
       <p:grpSpPr/>
       <p:pic>
         <p:nvPicPr>
-          <p:cNvPr id="2" name="34786186_3211008411_3751238116.mp4">
+          <p:cNvPr id="2" name="34786186_3211008411_3780824801.mp4">
             <a:hlinkClick r:id="" action="ppaction://media"/>
           </p:cNvPr>
           <p:cNvPicPr>
@@ -4342,7 +4409,7 @@
       <p:grpSpPr/>
       <p:pic>
         <p:nvPicPr>
-          <p:cNvPr id="2" name="34786186_1420726102_4152153373.mp4">
+          <p:cNvPr id="2" name="34786186_1420726102_844859006.mp4">
             <a:hlinkClick r:id="" action="ppaction://media"/>
           </p:cNvPr>
           <p:cNvPicPr>
@@ -4375,7 +4442,7 @@
       </p:pic>
       <p:pic>
         <p:nvPicPr>
-          <p:cNvPr id="3" name="34786186_1492757240_2486132252.mp4">
+          <p:cNvPr id="3" name="34786186_1492757240_4161145631.mp4">
             <a:hlinkClick r:id="" action="ppaction://media"/>
           </p:cNvPr>
           <p:cNvPicPr>
@@ -4664,7 +4731,7 @@
       <p:grpSpPr/>
       <p:pic>
         <p:nvPicPr>
-          <p:cNvPr id="2" name="34786186_2696675387_3773411577.mp4">
+          <p:cNvPr id="2" name="34786186_2696675387_637748599.mp4">
             <a:hlinkClick r:id="" action="ppaction://media"/>
           </p:cNvPr>
           <p:cNvPicPr>
@@ -4697,7 +4764,7 @@
       </p:pic>
       <p:pic>
         <p:nvPicPr>
-          <p:cNvPr id="3" name="34786186_1118075671_21488921.mp4">
+          <p:cNvPr id="3" name="34786186_1456082085_3897920503.mp4">
             <a:hlinkClick r:id="" action="ppaction://media"/>
           </p:cNvPr>
           <p:cNvPicPr>
@@ -4986,7 +5053,174 @@
       <p:grpSpPr/>
       <p:pic>
         <p:nvPicPr>
-          <p:cNvPr id="2" name="34786186_2280684391_700406015.mp4">
+          <p:cNvPr id="2" name="34786186_2473993837_3662324290.mp4">
+            <a:hlinkClick r:id="" action="ppaction://media"/>
+          </p:cNvPr>
+          <p:cNvPicPr>
+            <a:picLocks noChangeAspect="1"/>
+          </p:cNvPicPr>
+          <p:nvPr>
+            <a:videoFile r:link="rId4"/>
+            <p:extLst>
+              <p:ext uri="{DAA4B4D4-6D71-4841-9C94-3DE7FCFB9230}">
+                <p14:media xmlns:p14="http://schemas.microsoft.com/office/powerpoint/2010/main" r:embed="rId3"/>
+              </p:ext>
+            </p:extLst>
+          </p:nvPr>
+        </p:nvPicPr>
+        <p:blipFill>
+          <a:blip r:embed="rId5"/>
+          <a:stretch>
+            <a:fillRect/>
+          </a:stretch>
+        </p:blipFill>
+        <p:spPr>
+          <a:xfrm>
+            <a:off x="0" y="0"/>
+            <a:ext cx="18288000" cy="10287000"/>
+          </a:xfrm>
+          <a:prstGeom prst="rect">
+            <a:avLst/>
+          </a:prstGeom>
+        </p:spPr>
+      </p:pic>
+    </p:spTree>
+  </p:cSld>
+  <p:clrMapOvr>
+    <a:masterClrMapping/>
+  </p:clrMapOvr>
+  <p:timing>
+    <p:tnLst>
+      <p:par>
+        <p:cTn id="1" dur="indefinite" restart="never" nodeType="tmRoot">
+          <p:childTnLst>
+            <p:seq concurrent="1" nextAc="seek">
+              <p:cTn id="2" dur="indefinite" nodeType="mainSeq">
+                <p:childTnLst>
+                  <p:par>
+                    <p:cTn id="3" fill="hold">
+                      <p:stCondLst>
+                        <p:cond delay="indefinite"/>
+                        <p:cond evt="onBegin" delay="0">
+                          <p:tn val="2"/>
+                        </p:cond>
+                      </p:stCondLst>
+                      <p:childTnLst>
+                        <p:par>
+                          <p:cTn id="4" fill="hold">
+                            <p:stCondLst>
+                              <p:cond delay="0"/>
+                            </p:stCondLst>
+                            <p:childTnLst>
+                              <p:par>
+                                <p:cTn id="5" presetID="1" presetClass="entr" presetSubtype="0" fill="hold" nodeType="withEffect">
+                                  <p:stCondLst>
+                                    <p:cond delay="0"/>
+                                  </p:stCondLst>
+                                  <p:childTnLst>
+                                    <p:set>
+                                      <p:cBhvr>
+                                        <p:cTn id="6" dur="1" fill="hold">
+                                          <p:stCondLst>
+                                            <p:cond delay="0"/>
+                                          </p:stCondLst>
+                                        </p:cTn>
+                                        <p:tgtEl>
+                                          <p:spTgt spid="2"/>
+                                        </p:tgtEl>
+                                        <p:attrNameLst>
+                                          <p:attrName>style.visibility</p:attrName>
+                                        </p:attrNameLst>
+                                      </p:cBhvr>
+                                      <p:to>
+                                        <p:strVal val="visible"/>
+                                      </p:to>
+                                    </p:set>
+                                  </p:childTnLst>
+                                </p:cTn>
+                              </p:par>
+                            </p:childTnLst>
+                          </p:cTn>
+                        </p:par>
+                        <p:par>
+                          <p:cTn id="7" fill="hold">
+                            <p:stCondLst>
+                              <p:cond delay="0"/>
+                            </p:stCondLst>
+                            <p:childTnLst>
+                              <p:par>
+                                <p:cTn id="8" presetID="1" presetClass="mediacall" presetSubtype="0" fill="hold" nodeType="afterEffect">
+                                  <p:stCondLst>
+                                    <p:cond delay="0"/>
+                                  </p:stCondLst>
+                                  <p:childTnLst>
+                                    <p:cmd type="call" cmd="playFrom(0.0)">
+                                      <p:cBhvr>
+                                        <p:cTn id="9" dur="1000" fill="hold"/>
+                                        <p:tgtEl>
+                                          <p:spTgt spid="2"/>
+                                        </p:tgtEl>
+                                      </p:cBhvr>
+                                    </p:cmd>
+                                  </p:childTnLst>
+                                </p:cTn>
+                              </p:par>
+                            </p:childTnLst>
+                          </p:cTn>
+                        </p:par>
+                      </p:childTnLst>
+                    </p:cTn>
+                  </p:par>
+                </p:childTnLst>
+              </p:cTn>
+              <p:prevCondLst>
+                <p:cond evt="onPrev" delay="0">
+                  <p:tgtEl>
+                    <p:sldTgt/>
+                  </p:tgtEl>
+                </p:cond>
+              </p:prevCondLst>
+              <p:nextCondLst>
+                <p:cond evt="onNext" delay="0">
+                  <p:tgtEl>
+                    <p:sldTgt/>
+                  </p:tgtEl>
+                </p:cond>
+              </p:nextCondLst>
+            </p:seq>
+            <p:video>
+              <p:cMediaNode vol="80000">
+                <p:cTn id="10" fill="hold" display="0">
+                  <p:stCondLst>
+                    <p:cond delay="indefinite"/>
+                  </p:stCondLst>
+                </p:cTn>
+                <p:tgtEl>
+                  <p:spTgt spid="2"/>
+                </p:tgtEl>
+              </p:cMediaNode>
+            </p:video>
+          </p:childTnLst>
+        </p:cTn>
+      </p:par>
+    </p:tnLst>
+  </p:timing>
+</p:sld>
+</file>
+
+<file path=ppt/slides/slide7.xml><?xml version="1.0" encoding="utf-8"?>
+<p:sld xmlns:a="http://schemas.openxmlformats.org/drawingml/2006/main" xmlns:p="http://schemas.openxmlformats.org/presentationml/2006/main" xmlns:r="http://schemas.openxmlformats.org/officeDocument/2006/relationships">
+  <p:cSld>
+    <p:spTree>
+      <p:nvGrpSpPr>
+        <p:cNvPr id="1" name=""/>
+        <p:cNvGrpSpPr/>
+        <p:nvPr/>
+      </p:nvGrpSpPr>
+      <p:grpSpPr/>
+      <p:pic>
+        <p:nvPicPr>
+          <p:cNvPr id="2" name="34786186_3564100386_3082365739.mp4">
             <a:hlinkClick r:id="" action="ppaction://media"/>
           </p:cNvPr>
           <p:cNvPicPr>

</xml_diff>

<commit_message>
update readme and add final pptx
</commit_message>
<xml_diff>
--- a/pptx/Slides.pptx
+++ b/pptx/Slides.pptx
@@ -4,27 +4,30 @@
   <p:sldMasterIdLst>
     <p:sldMasterId id="2147483648" r:id="rId1"/>
   </p:sldMasterIdLst>
+  <p:notesMasterIdLst>
+    <p:notesMasterId r:id="rId20"/>
+  </p:notesMasterIdLst>
   <p:sldIdLst>
-    <p:sldId id="256" r:id="rId7"/>
-    <p:sldId id="257" r:id="rId9"/>
-    <p:sldId id="258" r:id="rId10"/>
-    <p:sldId id="259" r:id="rId11"/>
-    <p:sldId id="260" r:id="rId12"/>
-    <p:sldId id="261" r:id="rId13"/>
-    <p:sldId id="262" r:id="rId14"/>
-    <p:sldId id="263" r:id="rId15"/>
-    <p:sldId id="264" r:id="rId16"/>
-    <p:sldId id="265" r:id="rId17"/>
-    <p:sldId id="266" r:id="rId18"/>
-    <p:sldId id="267" r:id="rId19"/>
-    <p:sldId id="268" r:id="rId20"/>
-    <p:sldId id="269" r:id="rId21"/>
-    <p:sldId id="270" r:id="rId22"/>
-    <p:sldId id="271" r:id="rId23"/>
-    <p:sldId id="272" r:id="rId24"/>
-    <p:sldId id="273" r:id="rId25"/>
+    <p:sldId id="256" r:id="rId2"/>
+    <p:sldId id="257" r:id="rId3"/>
+    <p:sldId id="258" r:id="rId4"/>
+    <p:sldId id="259" r:id="rId5"/>
+    <p:sldId id="260" r:id="rId6"/>
+    <p:sldId id="261" r:id="rId7"/>
+    <p:sldId id="262" r:id="rId8"/>
+    <p:sldId id="263" r:id="rId9"/>
+    <p:sldId id="264" r:id="rId10"/>
+    <p:sldId id="265" r:id="rId11"/>
+    <p:sldId id="266" r:id="rId12"/>
+    <p:sldId id="267" r:id="rId13"/>
+    <p:sldId id="268" r:id="rId14"/>
+    <p:sldId id="269" r:id="rId15"/>
+    <p:sldId id="270" r:id="rId16"/>
+    <p:sldId id="271" r:id="rId17"/>
+    <p:sldId id="272" r:id="rId18"/>
+    <p:sldId id="273" r:id="rId19"/>
   </p:sldIdLst>
-  <p:sldSz cx="18288000" cy="10287000" type="screen4x3"/>
+  <p:sldSz cx="18288000" cy="10287000"/>
   <p:notesSz cx="6858000" cy="9144000"/>
   <p:defaultTextStyle>
     <a:defPPr>
@@ -121,11 +124,27 @@
       </a:defRPr>
     </a:lvl9pPr>
   </p:defaultTextStyle>
+  <p:extLst>
+    <p:ext uri="{EFAFB233-063F-42B5-8137-9DF3F51BA10A}">
+      <p15:sldGuideLst xmlns:p15="http://schemas.microsoft.com/office/powerpoint/2012/main">
+        <p15:guide id="1" orient="horz" pos="2160">
+          <p15:clr>
+            <a:srgbClr val="A4A3A4"/>
+          </p15:clr>
+        </p15:guide>
+        <p15:guide id="2" pos="2880">
+          <p15:clr>
+            <a:srgbClr val="A4A3A4"/>
+          </p15:clr>
+        </p15:guide>
+      </p15:sldGuideLst>
+    </p:ext>
+  </p:extLst>
 </p:presentation>
 </file>
 
 <file path=ppt/notesMasters/notesMaster1.xml><?xml version="1.0" encoding="utf-8"?>
-<p:notesMaster xmlns:a="http://schemas.openxmlformats.org/drawingml/2006/main" xmlns:p="http://schemas.openxmlformats.org/presentationml/2006/main" xmlns:r="http://schemas.openxmlformats.org/officeDocument/2006/relationships">
+<p:notesMaster xmlns:a="http://schemas.openxmlformats.org/drawingml/2006/main" xmlns:r="http://schemas.openxmlformats.org/officeDocument/2006/relationships" xmlns:p="http://schemas.openxmlformats.org/presentationml/2006/main">
   <p:cSld>
     <p:bg>
       <p:bgRef idx="1001">
@@ -146,241 +165,16 @@
           <a:chExt cx="0" cy="0"/>
         </a:xfrm>
       </p:grpSpPr>
-      <p:sp>
-        <p:nvSpPr>
-          <p:cNvPr id="2" name="Header Placeholder 1"/>
-          <p:cNvSpPr>
-            <a:spLocks noGrp="1"/>
-          </p:cNvSpPr>
-          <p:nvPr>
-            <p:ph type="hdr" sz="quarter"/>
-          </p:nvPr>
-        </p:nvSpPr>
-        <p:spPr>
-          <a:xfrm>
-            <a:off x="0" y="0"/>
-            <a:ext cx="2971800" cy="457200"/>
-          </a:xfrm>
-          <a:prstGeom prst="rect">
-            <a:avLst/>
-          </a:prstGeom>
-        </p:spPr>
-        <p:txBody>
-          <a:bodyPr vert="horz" lIns="91440" tIns="45720" rIns="91440" bIns="45720" rtlCol="0"/>
-          <a:lstStyle>
-            <a:lvl1pPr algn="l">
-              <a:defRPr sz="1200"/>
-            </a:lvl1pPr>
-          </a:lstStyle>
-          <a:p>
-            <a:endParaRPr lang="en-US"/>
-          </a:p>
-        </p:txBody>
-      </p:sp>
-      <p:sp>
-        <p:nvSpPr>
-          <p:cNvPr id="3" name="Date Placeholder 2"/>
-          <p:cNvSpPr>
-            <a:spLocks noGrp="1"/>
-          </p:cNvSpPr>
-          <p:nvPr>
-            <p:ph type="dt" idx="1"/>
-          </p:nvPr>
-        </p:nvSpPr>
-        <p:spPr>
-          <a:xfrm>
-            <a:off x="3884613" y="0"/>
-            <a:ext cx="2971800" cy="457200"/>
-          </a:xfrm>
-          <a:prstGeom prst="rect">
-            <a:avLst/>
-          </a:prstGeom>
-        </p:spPr>
-        <p:txBody>
-          <a:bodyPr vert="horz" lIns="91440" tIns="45720" rIns="91440" bIns="45720" rtlCol="0"/>
-          <a:lstStyle>
-            <a:lvl1pPr algn="r">
-              <a:defRPr sz="1200"/>
-            </a:lvl1pPr>
-          </a:lstStyle>
-          <a:p>
-            <a:fld id="{0F89C1C7-3DCD-1040-A9CF-14679D8B5DDD}" type="datetimeFigureOut">
-              <a:rPr lang="en-US" smtClean="0"/>
-              <a:t>10/17/16</a:t>
-            </a:fld>
-            <a:endParaRPr lang="en-US"/>
-          </a:p>
-        </p:txBody>
-      </p:sp>
-      <p:sp>
-        <p:nvSpPr>
-          <p:cNvPr id="4" name="Slide Image Placeholder 3"/>
-          <p:cNvSpPr>
-            <a:spLocks noGrp="1" noRot="1" noChangeAspect="1"/>
-          </p:cNvSpPr>
-          <p:nvPr>
-            <p:ph type="sldImg" idx="2"/>
-          </p:nvPr>
-        </p:nvSpPr>
-        <p:spPr>
-          <a:xfrm>
-            <a:off x="1143000" y="685800"/>
-            <a:ext cx="4572000" cy="3429000"/>
-          </a:xfrm>
-          <a:prstGeom prst="rect">
-            <a:avLst/>
-          </a:prstGeom>
-          <a:noFill/>
-          <a:ln w="12700">
-            <a:solidFill>
-              <a:prstClr val="black"/>
-            </a:solidFill>
-          </a:ln>
-        </p:spPr>
-        <p:txBody>
-          <a:bodyPr vert="horz" lIns="91440" tIns="45720" rIns="91440" bIns="45720" rtlCol="0" anchor="ctr"/>
-          <a:lstStyle/>
-          <a:p>
-            <a:endParaRPr lang="en-US"/>
-          </a:p>
-        </p:txBody>
-      </p:sp>
-      <p:sp>
-        <p:nvSpPr>
-          <p:cNvPr id="5" name="Notes Placeholder 4"/>
-          <p:cNvSpPr>
-            <a:spLocks noGrp="1"/>
-          </p:cNvSpPr>
-          <p:nvPr>
-            <p:ph type="body" sz="quarter" idx="3"/>
-          </p:nvPr>
-        </p:nvSpPr>
-        <p:spPr>
-          <a:xfrm>
-            <a:off x="685800" y="4343400"/>
-            <a:ext cx="5486400" cy="4114800"/>
-          </a:xfrm>
-          <a:prstGeom prst="rect">
-            <a:avLst/>
-          </a:prstGeom>
-        </p:spPr>
-        <p:txBody>
-          <a:bodyPr vert="horz" lIns="91440" tIns="45720" rIns="91440" bIns="45720" rtlCol="0"/>
-          <a:lstStyle/>
-          <a:p>
-            <a:pPr lvl="0"/>
-            <a:r>
-              <a:rPr lang="en-US" smtClean="0"/>
-              <a:t>Click to edit Master text styles</a:t>
-            </a:r>
-          </a:p>
-          <a:p>
-            <a:pPr lvl="1"/>
-            <a:r>
-              <a:rPr lang="en-US" smtClean="0"/>
-              <a:t>Second level</a:t>
-            </a:r>
-          </a:p>
-          <a:p>
-            <a:pPr lvl="2"/>
-            <a:r>
-              <a:rPr lang="en-US" smtClean="0"/>
-              <a:t>Third level</a:t>
-            </a:r>
-          </a:p>
-          <a:p>
-            <a:pPr lvl="3"/>
-            <a:r>
-              <a:rPr lang="en-US" smtClean="0"/>
-              <a:t>Fourth level</a:t>
-            </a:r>
-          </a:p>
-          <a:p>
-            <a:pPr lvl="4"/>
-            <a:r>
-              <a:rPr lang="en-US" smtClean="0"/>
-              <a:t>Fifth level</a:t>
-            </a:r>
-            <a:endParaRPr lang="en-US"/>
-          </a:p>
-        </p:txBody>
-      </p:sp>
-      <p:sp>
-        <p:nvSpPr>
-          <p:cNvPr id="6" name="Footer Placeholder 5"/>
-          <p:cNvSpPr>
-            <a:spLocks noGrp="1"/>
-          </p:cNvSpPr>
-          <p:nvPr>
-            <p:ph type="ftr" sz="quarter" idx="4"/>
-          </p:nvPr>
-        </p:nvSpPr>
-        <p:spPr>
-          <a:xfrm>
-            <a:off x="0" y="8685213"/>
-            <a:ext cx="2971800" cy="457200"/>
-          </a:xfrm>
-          <a:prstGeom prst="rect">
-            <a:avLst/>
-          </a:prstGeom>
-        </p:spPr>
-        <p:txBody>
-          <a:bodyPr vert="horz" lIns="91440" tIns="45720" rIns="91440" bIns="45720" rtlCol="0" anchor="b"/>
-          <a:lstStyle>
-            <a:lvl1pPr algn="l">
-              <a:defRPr sz="1200"/>
-            </a:lvl1pPr>
-          </a:lstStyle>
-          <a:p>
-            <a:endParaRPr lang="en-US"/>
-          </a:p>
-        </p:txBody>
-      </p:sp>
-      <p:sp>
-        <p:nvSpPr>
-          <p:cNvPr id="7" name="Slide Number Placeholder 6"/>
-          <p:cNvSpPr>
-            <a:spLocks noGrp="1"/>
-          </p:cNvSpPr>
-          <p:nvPr>
-            <p:ph type="sldNum" sz="quarter" idx="5"/>
-          </p:nvPr>
-        </p:nvSpPr>
-        <p:spPr>
-          <a:xfrm>
-            <a:off x="3884613" y="8685213"/>
-            <a:ext cx="2971800" cy="457200"/>
-          </a:xfrm>
-          <a:prstGeom prst="rect">
-            <a:avLst/>
-          </a:prstGeom>
-        </p:spPr>
-        <p:txBody>
-          <a:bodyPr vert="horz" lIns="91440" tIns="45720" rIns="91440" bIns="45720" rtlCol="0" anchor="b"/>
-          <a:lstStyle>
-            <a:lvl1pPr algn="r">
-              <a:defRPr sz="1200"/>
-            </a:lvl1pPr>
-          </a:lstStyle>
-          <a:p>
-            <a:fld id="{BB5E49A5-4136-284D-997B-48E1D791AD67}" type="slidenum">
-              <a:rPr lang="en-US" smtClean="0"/>
-              <a:t>‹#›</a:t>
-            </a:fld>
-            <a:endParaRPr lang="en-US"/>
-          </a:p>
-        </p:txBody>
-      </p:sp>
     </p:spTree>
     <p:extLst>
       <p:ext uri="{BB962C8B-B14F-4D97-AF65-F5344CB8AC3E}">
-        <p14:creationId xmlns:p14="http://schemas.microsoft.com/office/powerpoint/2010/main" val="2623252185"/>
+        <p14:creationId xmlns:p14="http://schemas.microsoft.com/office/powerpoint/2010/main" val="281801692"/>
       </p:ext>
     </p:extLst>
   </p:cSld>
   <p:clrMap bg1="lt1" tx1="dk1" bg2="lt2" tx2="dk2" accent1="accent1" accent2="accent2" accent3="accent3" accent4="accent4" accent5="accent5" accent6="accent6" hlink="hlink" folHlink="folHlink"/>
   <p:notesStyle>
-    <a:lvl1pPr marL="0" algn="l" defTabSz="457200" rtl="0" eaLnBrk="1" latinLnBrk="0" hangingPunct="1">
+    <a:lvl1pPr marL="0" algn="l" defTabSz="914400" rtl="0" eaLnBrk="1" latinLnBrk="0" hangingPunct="1">
       <a:defRPr sz="1200" kern="1200">
         <a:solidFill>
           <a:schemeClr val="tx1"/>
@@ -390,7 +184,7 @@
         <a:cs typeface="+mn-cs"/>
       </a:defRPr>
     </a:lvl1pPr>
-    <a:lvl2pPr marL="457200" algn="l" defTabSz="457200" rtl="0" eaLnBrk="1" latinLnBrk="0" hangingPunct="1">
+    <a:lvl2pPr marL="457200" algn="l" defTabSz="914400" rtl="0" eaLnBrk="1" latinLnBrk="0" hangingPunct="1">
       <a:defRPr sz="1200" kern="1200">
         <a:solidFill>
           <a:schemeClr val="tx1"/>
@@ -400,7 +194,7 @@
         <a:cs typeface="+mn-cs"/>
       </a:defRPr>
     </a:lvl2pPr>
-    <a:lvl3pPr marL="914400" algn="l" defTabSz="457200" rtl="0" eaLnBrk="1" latinLnBrk="0" hangingPunct="1">
+    <a:lvl3pPr marL="914400" algn="l" defTabSz="914400" rtl="0" eaLnBrk="1" latinLnBrk="0" hangingPunct="1">
       <a:defRPr sz="1200" kern="1200">
         <a:solidFill>
           <a:schemeClr val="tx1"/>
@@ -410,7 +204,7 @@
         <a:cs typeface="+mn-cs"/>
       </a:defRPr>
     </a:lvl3pPr>
-    <a:lvl4pPr marL="1371600" algn="l" defTabSz="457200" rtl="0" eaLnBrk="1" latinLnBrk="0" hangingPunct="1">
+    <a:lvl4pPr marL="1371600" algn="l" defTabSz="914400" rtl="0" eaLnBrk="1" latinLnBrk="0" hangingPunct="1">
       <a:defRPr sz="1200" kern="1200">
         <a:solidFill>
           <a:schemeClr val="tx1"/>
@@ -420,7 +214,7 @@
         <a:cs typeface="+mn-cs"/>
       </a:defRPr>
     </a:lvl4pPr>
-    <a:lvl5pPr marL="1828800" algn="l" defTabSz="457200" rtl="0" eaLnBrk="1" latinLnBrk="0" hangingPunct="1">
+    <a:lvl5pPr marL="1828800" algn="l" defTabSz="914400" rtl="0" eaLnBrk="1" latinLnBrk="0" hangingPunct="1">
       <a:defRPr sz="1200" kern="1200">
         <a:solidFill>
           <a:schemeClr val="tx1"/>
@@ -430,7 +224,7 @@
         <a:cs typeface="+mn-cs"/>
       </a:defRPr>
     </a:lvl5pPr>
-    <a:lvl6pPr marL="2286000" algn="l" defTabSz="457200" rtl="0" eaLnBrk="1" latinLnBrk="0" hangingPunct="1">
+    <a:lvl6pPr marL="2286000" algn="l" defTabSz="914400" rtl="0" eaLnBrk="1" latinLnBrk="0" hangingPunct="1">
       <a:defRPr sz="1200" kern="1200">
         <a:solidFill>
           <a:schemeClr val="tx1"/>
@@ -440,7 +234,7 @@
         <a:cs typeface="+mn-cs"/>
       </a:defRPr>
     </a:lvl6pPr>
-    <a:lvl7pPr marL="2743200" algn="l" defTabSz="457200" rtl="0" eaLnBrk="1" latinLnBrk="0" hangingPunct="1">
+    <a:lvl7pPr marL="2743200" algn="l" defTabSz="914400" rtl="0" eaLnBrk="1" latinLnBrk="0" hangingPunct="1">
       <a:defRPr sz="1200" kern="1200">
         <a:solidFill>
           <a:schemeClr val="tx1"/>
@@ -450,7 +244,7 @@
         <a:cs typeface="+mn-cs"/>
       </a:defRPr>
     </a:lvl7pPr>
-    <a:lvl8pPr marL="3200400" algn="l" defTabSz="457200" rtl="0" eaLnBrk="1" latinLnBrk="0" hangingPunct="1">
+    <a:lvl8pPr marL="3200400" algn="l" defTabSz="914400" rtl="0" eaLnBrk="1" latinLnBrk="0" hangingPunct="1">
       <a:defRPr sz="1200" kern="1200">
         <a:solidFill>
           <a:schemeClr val="tx1"/>
@@ -460,7 +254,7 @@
         <a:cs typeface="+mn-cs"/>
       </a:defRPr>
     </a:lvl8pPr>
-    <a:lvl9pPr marL="3657600" algn="l" defTabSz="457200" rtl="0" eaLnBrk="1" latinLnBrk="0" hangingPunct="1">
+    <a:lvl9pPr marL="3657600" algn="l" defTabSz="914400" rtl="0" eaLnBrk="1" latinLnBrk="0" hangingPunct="1">
       <a:defRPr sz="1200" kern="1200">
         <a:solidFill>
           <a:schemeClr val="tx1"/>
@@ -475,7 +269,7 @@
 </file>
 
 <file path=ppt/notesSlides/notesSlide1.xml><?xml version="1.0" encoding="utf-8"?>
-<p:notes xmlns:a="http://schemas.openxmlformats.org/drawingml/2006/main" xmlns:p="http://schemas.openxmlformats.org/presentationml/2006/main" xmlns:r="http://schemas.openxmlformats.org/officeDocument/2006/relationships">
+<p:notes xmlns:a="http://schemas.openxmlformats.org/drawingml/2006/main" xmlns:r="http://schemas.openxmlformats.org/officeDocument/2006/relationships" xmlns:p="http://schemas.openxmlformats.org/presentationml/2006/main">
   <p:cSld>
     <p:spTree>
       <p:nvGrpSpPr>
@@ -495,7 +289,7 @@
         <p:nvSpPr>
           <p:cNvPr id="2" name="Slide Image Placeholder 1"/>
           <p:cNvSpPr>
-            <a:spLocks noGrp="1"/>
+            <a:spLocks noGrp="1" noRot="1" noChangeAspect="1"/>
           </p:cNvSpPr>
           <p:nvPr>
             <p:ph type="sldImg" idx="2"/>
@@ -510,14 +304,16 @@
             <a:spLocks noGrp="1"/>
           </p:cNvSpPr>
           <p:nvPr>
-            <p:ph type="body" idx="3" sz="quarter"/>
+            <p:ph type="body" sz="quarter" idx="3"/>
           </p:nvPr>
         </p:nvSpPr>
         <p:spPr/>
         <p:txBody>
           <a:bodyPr/>
           <a:lstStyle/>
-          <a:p/>
+          <a:p>
+            <a:endParaRPr/>
+          </a:p>
         </p:txBody>
       </p:sp>
       <p:sp>
@@ -527,7 +323,7 @@
             <a:spLocks noGrp="1"/>
           </p:cNvSpPr>
           <p:nvPr>
-            <p:ph type="sldNum" idx="5" sz="quarter"/>
+            <p:ph type="sldNum" sz="quarter" idx="5"/>
           </p:nvPr>
         </p:nvSpPr>
         <p:spPr/>
@@ -541,7 +337,7 @@
 </file>
 
 <file path=ppt/notesSlides/notesSlide10.xml><?xml version="1.0" encoding="utf-8"?>
-<p:notes xmlns:a="http://schemas.openxmlformats.org/drawingml/2006/main" xmlns:p="http://schemas.openxmlformats.org/presentationml/2006/main" xmlns:r="http://schemas.openxmlformats.org/officeDocument/2006/relationships">
+<p:notes xmlns:a="http://schemas.openxmlformats.org/drawingml/2006/main" xmlns:r="http://schemas.openxmlformats.org/officeDocument/2006/relationships" xmlns:p="http://schemas.openxmlformats.org/presentationml/2006/main">
   <p:cSld>
     <p:spTree>
       <p:nvGrpSpPr>
@@ -561,7 +357,7 @@
         <p:nvSpPr>
           <p:cNvPr id="2" name="Slide Image Placeholder 1"/>
           <p:cNvSpPr>
-            <a:spLocks noGrp="1"/>
+            <a:spLocks noGrp="1" noRot="1" noChangeAspect="1"/>
           </p:cNvSpPr>
           <p:nvPr>
             <p:ph type="sldImg" idx="2"/>
@@ -576,14 +372,16 @@
             <a:spLocks noGrp="1"/>
           </p:cNvSpPr>
           <p:nvPr>
-            <p:ph type="body" idx="3" sz="quarter"/>
+            <p:ph type="body" sz="quarter" idx="3"/>
           </p:nvPr>
         </p:nvSpPr>
         <p:spPr/>
         <p:txBody>
           <a:bodyPr/>
           <a:lstStyle/>
-          <a:p/>
+          <a:p>
+            <a:endParaRPr/>
+          </a:p>
         </p:txBody>
       </p:sp>
       <p:sp>
@@ -593,7 +391,7 @@
             <a:spLocks noGrp="1"/>
           </p:cNvSpPr>
           <p:nvPr>
-            <p:ph type="sldNum" idx="5" sz="quarter"/>
+            <p:ph type="sldNum" sz="quarter" idx="5"/>
           </p:nvPr>
         </p:nvSpPr>
         <p:spPr/>
@@ -607,7 +405,7 @@
 </file>
 
 <file path=ppt/notesSlides/notesSlide11.xml><?xml version="1.0" encoding="utf-8"?>
-<p:notes xmlns:a="http://schemas.openxmlformats.org/drawingml/2006/main" xmlns:p="http://schemas.openxmlformats.org/presentationml/2006/main" xmlns:r="http://schemas.openxmlformats.org/officeDocument/2006/relationships">
+<p:notes xmlns:a="http://schemas.openxmlformats.org/drawingml/2006/main" xmlns:r="http://schemas.openxmlformats.org/officeDocument/2006/relationships" xmlns:p="http://schemas.openxmlformats.org/presentationml/2006/main">
   <p:cSld>
     <p:spTree>
       <p:nvGrpSpPr>
@@ -627,7 +425,7 @@
         <p:nvSpPr>
           <p:cNvPr id="2" name="Slide Image Placeholder 1"/>
           <p:cNvSpPr>
-            <a:spLocks noGrp="1"/>
+            <a:spLocks noGrp="1" noRot="1" noChangeAspect="1"/>
           </p:cNvSpPr>
           <p:nvPr>
             <p:ph type="sldImg" idx="2"/>
@@ -642,14 +440,16 @@
             <a:spLocks noGrp="1"/>
           </p:cNvSpPr>
           <p:nvPr>
-            <p:ph type="body" idx="3" sz="quarter"/>
+            <p:ph type="body" sz="quarter" idx="3"/>
           </p:nvPr>
         </p:nvSpPr>
         <p:spPr/>
         <p:txBody>
           <a:bodyPr/>
           <a:lstStyle/>
-          <a:p/>
+          <a:p>
+            <a:endParaRPr/>
+          </a:p>
         </p:txBody>
       </p:sp>
       <p:sp>
@@ -659,7 +459,7 @@
             <a:spLocks noGrp="1"/>
           </p:cNvSpPr>
           <p:nvPr>
-            <p:ph type="sldNum" idx="5" sz="quarter"/>
+            <p:ph type="sldNum" sz="quarter" idx="5"/>
           </p:nvPr>
         </p:nvSpPr>
         <p:spPr/>
@@ -673,7 +473,7 @@
 </file>
 
 <file path=ppt/notesSlides/notesSlide12.xml><?xml version="1.0" encoding="utf-8"?>
-<p:notes xmlns:a="http://schemas.openxmlformats.org/drawingml/2006/main" xmlns:p="http://schemas.openxmlformats.org/presentationml/2006/main" xmlns:r="http://schemas.openxmlformats.org/officeDocument/2006/relationships">
+<p:notes xmlns:a="http://schemas.openxmlformats.org/drawingml/2006/main" xmlns:r="http://schemas.openxmlformats.org/officeDocument/2006/relationships" xmlns:p="http://schemas.openxmlformats.org/presentationml/2006/main">
   <p:cSld>
     <p:spTree>
       <p:nvGrpSpPr>
@@ -693,7 +493,7 @@
         <p:nvSpPr>
           <p:cNvPr id="2" name="Slide Image Placeholder 1"/>
           <p:cNvSpPr>
-            <a:spLocks noGrp="1"/>
+            <a:spLocks noGrp="1" noRot="1" noChangeAspect="1"/>
           </p:cNvSpPr>
           <p:nvPr>
             <p:ph type="sldImg" idx="2"/>
@@ -708,14 +508,16 @@
             <a:spLocks noGrp="1"/>
           </p:cNvSpPr>
           <p:nvPr>
-            <p:ph type="body" idx="3" sz="quarter"/>
+            <p:ph type="body" sz="quarter" idx="3"/>
           </p:nvPr>
         </p:nvSpPr>
         <p:spPr/>
         <p:txBody>
           <a:bodyPr/>
           <a:lstStyle/>
-          <a:p/>
+          <a:p>
+            <a:endParaRPr/>
+          </a:p>
         </p:txBody>
       </p:sp>
       <p:sp>
@@ -725,7 +527,7 @@
             <a:spLocks noGrp="1"/>
           </p:cNvSpPr>
           <p:nvPr>
-            <p:ph type="sldNum" idx="5" sz="quarter"/>
+            <p:ph type="sldNum" sz="quarter" idx="5"/>
           </p:nvPr>
         </p:nvSpPr>
         <p:spPr/>
@@ -739,7 +541,7 @@
 </file>
 
 <file path=ppt/notesSlides/notesSlide13.xml><?xml version="1.0" encoding="utf-8"?>
-<p:notes xmlns:a="http://schemas.openxmlformats.org/drawingml/2006/main" xmlns:p="http://schemas.openxmlformats.org/presentationml/2006/main" xmlns:r="http://schemas.openxmlformats.org/officeDocument/2006/relationships">
+<p:notes xmlns:a="http://schemas.openxmlformats.org/drawingml/2006/main" xmlns:r="http://schemas.openxmlformats.org/officeDocument/2006/relationships" xmlns:p="http://schemas.openxmlformats.org/presentationml/2006/main">
   <p:cSld>
     <p:spTree>
       <p:nvGrpSpPr>
@@ -759,7 +561,7 @@
         <p:nvSpPr>
           <p:cNvPr id="2" name="Slide Image Placeholder 1"/>
           <p:cNvSpPr>
-            <a:spLocks noGrp="1"/>
+            <a:spLocks noGrp="1" noRot="1" noChangeAspect="1"/>
           </p:cNvSpPr>
           <p:nvPr>
             <p:ph type="sldImg" idx="2"/>
@@ -774,14 +576,16 @@
             <a:spLocks noGrp="1"/>
           </p:cNvSpPr>
           <p:nvPr>
-            <p:ph type="body" idx="3" sz="quarter"/>
+            <p:ph type="body" sz="quarter" idx="3"/>
           </p:nvPr>
         </p:nvSpPr>
         <p:spPr/>
         <p:txBody>
           <a:bodyPr/>
           <a:lstStyle/>
-          <a:p/>
+          <a:p>
+            <a:endParaRPr/>
+          </a:p>
         </p:txBody>
       </p:sp>
       <p:sp>
@@ -791,7 +595,7 @@
             <a:spLocks noGrp="1"/>
           </p:cNvSpPr>
           <p:nvPr>
-            <p:ph type="sldNum" idx="5" sz="quarter"/>
+            <p:ph type="sldNum" sz="quarter" idx="5"/>
           </p:nvPr>
         </p:nvSpPr>
         <p:spPr/>
@@ -805,7 +609,7 @@
 </file>
 
 <file path=ppt/notesSlides/notesSlide14.xml><?xml version="1.0" encoding="utf-8"?>
-<p:notes xmlns:a="http://schemas.openxmlformats.org/drawingml/2006/main" xmlns:p="http://schemas.openxmlformats.org/presentationml/2006/main" xmlns:r="http://schemas.openxmlformats.org/officeDocument/2006/relationships">
+<p:notes xmlns:a="http://schemas.openxmlformats.org/drawingml/2006/main" xmlns:r="http://schemas.openxmlformats.org/officeDocument/2006/relationships" xmlns:p="http://schemas.openxmlformats.org/presentationml/2006/main">
   <p:cSld>
     <p:spTree>
       <p:nvGrpSpPr>
@@ -825,7 +629,7 @@
         <p:nvSpPr>
           <p:cNvPr id="2" name="Slide Image Placeholder 1"/>
           <p:cNvSpPr>
-            <a:spLocks noGrp="1"/>
+            <a:spLocks noGrp="1" noRot="1" noChangeAspect="1"/>
           </p:cNvSpPr>
           <p:nvPr>
             <p:ph type="sldImg" idx="2"/>
@@ -840,14 +644,16 @@
             <a:spLocks noGrp="1"/>
           </p:cNvSpPr>
           <p:nvPr>
-            <p:ph type="body" idx="3" sz="quarter"/>
+            <p:ph type="body" sz="quarter" idx="3"/>
           </p:nvPr>
         </p:nvSpPr>
         <p:spPr/>
         <p:txBody>
           <a:bodyPr/>
           <a:lstStyle/>
-          <a:p/>
+          <a:p>
+            <a:endParaRPr/>
+          </a:p>
         </p:txBody>
       </p:sp>
       <p:sp>
@@ -857,7 +663,7 @@
             <a:spLocks noGrp="1"/>
           </p:cNvSpPr>
           <p:nvPr>
-            <p:ph type="sldNum" idx="5" sz="quarter"/>
+            <p:ph type="sldNum" sz="quarter" idx="5"/>
           </p:nvPr>
         </p:nvSpPr>
         <p:spPr/>
@@ -871,7 +677,7 @@
 </file>
 
 <file path=ppt/notesSlides/notesSlide15.xml><?xml version="1.0" encoding="utf-8"?>
-<p:notes xmlns:a="http://schemas.openxmlformats.org/drawingml/2006/main" xmlns:p="http://schemas.openxmlformats.org/presentationml/2006/main" xmlns:r="http://schemas.openxmlformats.org/officeDocument/2006/relationships">
+<p:notes xmlns:a="http://schemas.openxmlformats.org/drawingml/2006/main" xmlns:r="http://schemas.openxmlformats.org/officeDocument/2006/relationships" xmlns:p="http://schemas.openxmlformats.org/presentationml/2006/main">
   <p:cSld>
     <p:spTree>
       <p:nvGrpSpPr>
@@ -891,7 +697,7 @@
         <p:nvSpPr>
           <p:cNvPr id="2" name="Slide Image Placeholder 1"/>
           <p:cNvSpPr>
-            <a:spLocks noGrp="1"/>
+            <a:spLocks noGrp="1" noRot="1" noChangeAspect="1"/>
           </p:cNvSpPr>
           <p:nvPr>
             <p:ph type="sldImg" idx="2"/>
@@ -906,14 +712,16 @@
             <a:spLocks noGrp="1"/>
           </p:cNvSpPr>
           <p:nvPr>
-            <p:ph type="body" idx="3" sz="quarter"/>
+            <p:ph type="body" sz="quarter" idx="3"/>
           </p:nvPr>
         </p:nvSpPr>
         <p:spPr/>
         <p:txBody>
           <a:bodyPr/>
           <a:lstStyle/>
-          <a:p/>
+          <a:p>
+            <a:endParaRPr/>
+          </a:p>
         </p:txBody>
       </p:sp>
       <p:sp>
@@ -923,7 +731,7 @@
             <a:spLocks noGrp="1"/>
           </p:cNvSpPr>
           <p:nvPr>
-            <p:ph type="sldNum" idx="5" sz="quarter"/>
+            <p:ph type="sldNum" sz="quarter" idx="5"/>
           </p:nvPr>
         </p:nvSpPr>
         <p:spPr/>
@@ -937,7 +745,7 @@
 </file>
 
 <file path=ppt/notesSlides/notesSlide16.xml><?xml version="1.0" encoding="utf-8"?>
-<p:notes xmlns:a="http://schemas.openxmlformats.org/drawingml/2006/main" xmlns:p="http://schemas.openxmlformats.org/presentationml/2006/main" xmlns:r="http://schemas.openxmlformats.org/officeDocument/2006/relationships">
+<p:notes xmlns:a="http://schemas.openxmlformats.org/drawingml/2006/main" xmlns:r="http://schemas.openxmlformats.org/officeDocument/2006/relationships" xmlns:p="http://schemas.openxmlformats.org/presentationml/2006/main">
   <p:cSld>
     <p:spTree>
       <p:nvGrpSpPr>
@@ -957,7 +765,7 @@
         <p:nvSpPr>
           <p:cNvPr id="2" name="Slide Image Placeholder 1"/>
           <p:cNvSpPr>
-            <a:spLocks noGrp="1"/>
+            <a:spLocks noGrp="1" noRot="1" noChangeAspect="1"/>
           </p:cNvSpPr>
           <p:nvPr>
             <p:ph type="sldImg" idx="2"/>
@@ -972,14 +780,16 @@
             <a:spLocks noGrp="1"/>
           </p:cNvSpPr>
           <p:nvPr>
-            <p:ph type="body" idx="3" sz="quarter"/>
+            <p:ph type="body" sz="quarter" idx="3"/>
           </p:nvPr>
         </p:nvSpPr>
         <p:spPr/>
         <p:txBody>
           <a:bodyPr/>
           <a:lstStyle/>
-          <a:p/>
+          <a:p>
+            <a:endParaRPr/>
+          </a:p>
         </p:txBody>
       </p:sp>
       <p:sp>
@@ -989,7 +799,7 @@
             <a:spLocks noGrp="1"/>
           </p:cNvSpPr>
           <p:nvPr>
-            <p:ph type="sldNum" idx="5" sz="quarter"/>
+            <p:ph type="sldNum" sz="quarter" idx="5"/>
           </p:nvPr>
         </p:nvSpPr>
         <p:spPr/>
@@ -1003,7 +813,7 @@
 </file>
 
 <file path=ppt/notesSlides/notesSlide17.xml><?xml version="1.0" encoding="utf-8"?>
-<p:notes xmlns:a="http://schemas.openxmlformats.org/drawingml/2006/main" xmlns:p="http://schemas.openxmlformats.org/presentationml/2006/main" xmlns:r="http://schemas.openxmlformats.org/officeDocument/2006/relationships">
+<p:notes xmlns:a="http://schemas.openxmlformats.org/drawingml/2006/main" xmlns:r="http://schemas.openxmlformats.org/officeDocument/2006/relationships" xmlns:p="http://schemas.openxmlformats.org/presentationml/2006/main">
   <p:cSld>
     <p:spTree>
       <p:nvGrpSpPr>
@@ -1023,7 +833,7 @@
         <p:nvSpPr>
           <p:cNvPr id="2" name="Slide Image Placeholder 1"/>
           <p:cNvSpPr>
-            <a:spLocks noGrp="1"/>
+            <a:spLocks noGrp="1" noRot="1" noChangeAspect="1"/>
           </p:cNvSpPr>
           <p:nvPr>
             <p:ph type="sldImg" idx="2"/>
@@ -1038,14 +848,16 @@
             <a:spLocks noGrp="1"/>
           </p:cNvSpPr>
           <p:nvPr>
-            <p:ph type="body" idx="3" sz="quarter"/>
+            <p:ph type="body" sz="quarter" idx="3"/>
           </p:nvPr>
         </p:nvSpPr>
         <p:spPr/>
         <p:txBody>
           <a:bodyPr/>
           <a:lstStyle/>
-          <a:p/>
+          <a:p>
+            <a:endParaRPr/>
+          </a:p>
         </p:txBody>
       </p:sp>
       <p:sp>
@@ -1055,7 +867,7 @@
             <a:spLocks noGrp="1"/>
           </p:cNvSpPr>
           <p:nvPr>
-            <p:ph type="sldNum" idx="5" sz="quarter"/>
+            <p:ph type="sldNum" sz="quarter" idx="5"/>
           </p:nvPr>
         </p:nvSpPr>
         <p:spPr/>
@@ -1069,7 +881,7 @@
 </file>
 
 <file path=ppt/notesSlides/notesSlide18.xml><?xml version="1.0" encoding="utf-8"?>
-<p:notes xmlns:a="http://schemas.openxmlformats.org/drawingml/2006/main" xmlns:p="http://schemas.openxmlformats.org/presentationml/2006/main" xmlns:r="http://schemas.openxmlformats.org/officeDocument/2006/relationships">
+<p:notes xmlns:a="http://schemas.openxmlformats.org/drawingml/2006/main" xmlns:r="http://schemas.openxmlformats.org/officeDocument/2006/relationships" xmlns:p="http://schemas.openxmlformats.org/presentationml/2006/main">
   <p:cSld>
     <p:spTree>
       <p:nvGrpSpPr>
@@ -1089,7 +901,7 @@
         <p:nvSpPr>
           <p:cNvPr id="2" name="Slide Image Placeholder 1"/>
           <p:cNvSpPr>
-            <a:spLocks noGrp="1"/>
+            <a:spLocks noGrp="1" noRot="1" noChangeAspect="1"/>
           </p:cNvSpPr>
           <p:nvPr>
             <p:ph type="sldImg" idx="2"/>
@@ -1104,14 +916,16 @@
             <a:spLocks noGrp="1"/>
           </p:cNvSpPr>
           <p:nvPr>
-            <p:ph type="body" idx="3" sz="quarter"/>
+            <p:ph type="body" sz="quarter" idx="3"/>
           </p:nvPr>
         </p:nvSpPr>
         <p:spPr/>
         <p:txBody>
           <a:bodyPr/>
           <a:lstStyle/>
-          <a:p/>
+          <a:p>
+            <a:endParaRPr/>
+          </a:p>
         </p:txBody>
       </p:sp>
       <p:sp>
@@ -1121,7 +935,7 @@
             <a:spLocks noGrp="1"/>
           </p:cNvSpPr>
           <p:nvPr>
-            <p:ph type="sldNum" idx="5" sz="quarter"/>
+            <p:ph type="sldNum" sz="quarter" idx="5"/>
           </p:nvPr>
         </p:nvSpPr>
         <p:spPr/>
@@ -1135,7 +949,7 @@
 </file>
 
 <file path=ppt/notesSlides/notesSlide2.xml><?xml version="1.0" encoding="utf-8"?>
-<p:notes xmlns:a="http://schemas.openxmlformats.org/drawingml/2006/main" xmlns:p="http://schemas.openxmlformats.org/presentationml/2006/main" xmlns:r="http://schemas.openxmlformats.org/officeDocument/2006/relationships">
+<p:notes xmlns:a="http://schemas.openxmlformats.org/drawingml/2006/main" xmlns:r="http://schemas.openxmlformats.org/officeDocument/2006/relationships" xmlns:p="http://schemas.openxmlformats.org/presentationml/2006/main">
   <p:cSld>
     <p:spTree>
       <p:nvGrpSpPr>
@@ -1155,7 +969,7 @@
         <p:nvSpPr>
           <p:cNvPr id="2" name="Slide Image Placeholder 1"/>
           <p:cNvSpPr>
-            <a:spLocks noGrp="1"/>
+            <a:spLocks noGrp="1" noRot="1" noChangeAspect="1"/>
           </p:cNvSpPr>
           <p:nvPr>
             <p:ph type="sldImg" idx="2"/>
@@ -1170,14 +984,16 @@
             <a:spLocks noGrp="1"/>
           </p:cNvSpPr>
           <p:nvPr>
-            <p:ph type="body" idx="3" sz="quarter"/>
+            <p:ph type="body" sz="quarter" idx="3"/>
           </p:nvPr>
         </p:nvSpPr>
         <p:spPr/>
         <p:txBody>
           <a:bodyPr/>
           <a:lstStyle/>
-          <a:p/>
+          <a:p>
+            <a:endParaRPr/>
+          </a:p>
         </p:txBody>
       </p:sp>
       <p:sp>
@@ -1187,7 +1003,7 @@
             <a:spLocks noGrp="1"/>
           </p:cNvSpPr>
           <p:nvPr>
-            <p:ph type="sldNum" idx="5" sz="quarter"/>
+            <p:ph type="sldNum" sz="quarter" idx="5"/>
           </p:nvPr>
         </p:nvSpPr>
         <p:spPr/>
@@ -1201,7 +1017,7 @@
 </file>
 
 <file path=ppt/notesSlides/notesSlide3.xml><?xml version="1.0" encoding="utf-8"?>
-<p:notes xmlns:a="http://schemas.openxmlformats.org/drawingml/2006/main" xmlns:p="http://schemas.openxmlformats.org/presentationml/2006/main" xmlns:r="http://schemas.openxmlformats.org/officeDocument/2006/relationships">
+<p:notes xmlns:a="http://schemas.openxmlformats.org/drawingml/2006/main" xmlns:r="http://schemas.openxmlformats.org/officeDocument/2006/relationships" xmlns:p="http://schemas.openxmlformats.org/presentationml/2006/main">
   <p:cSld>
     <p:spTree>
       <p:nvGrpSpPr>
@@ -1221,7 +1037,7 @@
         <p:nvSpPr>
           <p:cNvPr id="2" name="Slide Image Placeholder 1"/>
           <p:cNvSpPr>
-            <a:spLocks noGrp="1"/>
+            <a:spLocks noGrp="1" noRot="1" noChangeAspect="1"/>
           </p:cNvSpPr>
           <p:nvPr>
             <p:ph type="sldImg" idx="2"/>
@@ -1236,14 +1052,16 @@
             <a:spLocks noGrp="1"/>
           </p:cNvSpPr>
           <p:nvPr>
-            <p:ph type="body" idx="3" sz="quarter"/>
+            <p:ph type="body" sz="quarter" idx="3"/>
           </p:nvPr>
         </p:nvSpPr>
         <p:spPr/>
         <p:txBody>
           <a:bodyPr/>
           <a:lstStyle/>
-          <a:p/>
+          <a:p>
+            <a:endParaRPr/>
+          </a:p>
         </p:txBody>
       </p:sp>
       <p:sp>
@@ -1253,7 +1071,7 @@
             <a:spLocks noGrp="1"/>
           </p:cNvSpPr>
           <p:nvPr>
-            <p:ph type="sldNum" idx="5" sz="quarter"/>
+            <p:ph type="sldNum" sz="quarter" idx="5"/>
           </p:nvPr>
         </p:nvSpPr>
         <p:spPr/>
@@ -1267,7 +1085,7 @@
 </file>
 
 <file path=ppt/notesSlides/notesSlide4.xml><?xml version="1.0" encoding="utf-8"?>
-<p:notes xmlns:a="http://schemas.openxmlformats.org/drawingml/2006/main" xmlns:p="http://schemas.openxmlformats.org/presentationml/2006/main" xmlns:r="http://schemas.openxmlformats.org/officeDocument/2006/relationships">
+<p:notes xmlns:a="http://schemas.openxmlformats.org/drawingml/2006/main" xmlns:r="http://schemas.openxmlformats.org/officeDocument/2006/relationships" xmlns:p="http://schemas.openxmlformats.org/presentationml/2006/main">
   <p:cSld>
     <p:spTree>
       <p:nvGrpSpPr>
@@ -1287,7 +1105,7 @@
         <p:nvSpPr>
           <p:cNvPr id="2" name="Slide Image Placeholder 1"/>
           <p:cNvSpPr>
-            <a:spLocks noGrp="1"/>
+            <a:spLocks noGrp="1" noRot="1" noChangeAspect="1"/>
           </p:cNvSpPr>
           <p:nvPr>
             <p:ph type="sldImg" idx="2"/>
@@ -1302,14 +1120,16 @@
             <a:spLocks noGrp="1"/>
           </p:cNvSpPr>
           <p:nvPr>
-            <p:ph type="body" idx="3" sz="quarter"/>
+            <p:ph type="body" sz="quarter" idx="3"/>
           </p:nvPr>
         </p:nvSpPr>
         <p:spPr/>
         <p:txBody>
           <a:bodyPr/>
           <a:lstStyle/>
-          <a:p/>
+          <a:p>
+            <a:endParaRPr/>
+          </a:p>
         </p:txBody>
       </p:sp>
       <p:sp>
@@ -1319,7 +1139,7 @@
             <a:spLocks noGrp="1"/>
           </p:cNvSpPr>
           <p:nvPr>
-            <p:ph type="sldNum" idx="5" sz="quarter"/>
+            <p:ph type="sldNum" sz="quarter" idx="5"/>
           </p:nvPr>
         </p:nvSpPr>
         <p:spPr/>
@@ -1333,7 +1153,7 @@
 </file>
 
 <file path=ppt/notesSlides/notesSlide5.xml><?xml version="1.0" encoding="utf-8"?>
-<p:notes xmlns:a="http://schemas.openxmlformats.org/drawingml/2006/main" xmlns:p="http://schemas.openxmlformats.org/presentationml/2006/main" xmlns:r="http://schemas.openxmlformats.org/officeDocument/2006/relationships">
+<p:notes xmlns:a="http://schemas.openxmlformats.org/drawingml/2006/main" xmlns:r="http://schemas.openxmlformats.org/officeDocument/2006/relationships" xmlns:p="http://schemas.openxmlformats.org/presentationml/2006/main">
   <p:cSld>
     <p:spTree>
       <p:nvGrpSpPr>
@@ -1353,7 +1173,7 @@
         <p:nvSpPr>
           <p:cNvPr id="2" name="Slide Image Placeholder 1"/>
           <p:cNvSpPr>
-            <a:spLocks noGrp="1"/>
+            <a:spLocks noGrp="1" noRot="1" noChangeAspect="1"/>
           </p:cNvSpPr>
           <p:nvPr>
             <p:ph type="sldImg" idx="2"/>
@@ -1368,14 +1188,16 @@
             <a:spLocks noGrp="1"/>
           </p:cNvSpPr>
           <p:nvPr>
-            <p:ph type="body" idx="3" sz="quarter"/>
+            <p:ph type="body" sz="quarter" idx="3"/>
           </p:nvPr>
         </p:nvSpPr>
         <p:spPr/>
         <p:txBody>
           <a:bodyPr/>
           <a:lstStyle/>
-          <a:p/>
+          <a:p>
+            <a:endParaRPr/>
+          </a:p>
         </p:txBody>
       </p:sp>
       <p:sp>
@@ -1385,7 +1207,7 @@
             <a:spLocks noGrp="1"/>
           </p:cNvSpPr>
           <p:nvPr>
-            <p:ph type="sldNum" idx="5" sz="quarter"/>
+            <p:ph type="sldNum" sz="quarter" idx="5"/>
           </p:nvPr>
         </p:nvSpPr>
         <p:spPr/>
@@ -1399,7 +1221,7 @@
 </file>
 
 <file path=ppt/notesSlides/notesSlide6.xml><?xml version="1.0" encoding="utf-8"?>
-<p:notes xmlns:a="http://schemas.openxmlformats.org/drawingml/2006/main" xmlns:p="http://schemas.openxmlformats.org/presentationml/2006/main" xmlns:r="http://schemas.openxmlformats.org/officeDocument/2006/relationships">
+<p:notes xmlns:a="http://schemas.openxmlformats.org/drawingml/2006/main" xmlns:r="http://schemas.openxmlformats.org/officeDocument/2006/relationships" xmlns:p="http://schemas.openxmlformats.org/presentationml/2006/main">
   <p:cSld>
     <p:spTree>
       <p:nvGrpSpPr>
@@ -1419,7 +1241,7 @@
         <p:nvSpPr>
           <p:cNvPr id="2" name="Slide Image Placeholder 1"/>
           <p:cNvSpPr>
-            <a:spLocks noGrp="1"/>
+            <a:spLocks noGrp="1" noRot="1" noChangeAspect="1"/>
           </p:cNvSpPr>
           <p:nvPr>
             <p:ph type="sldImg" idx="2"/>
@@ -1434,14 +1256,16 @@
             <a:spLocks noGrp="1"/>
           </p:cNvSpPr>
           <p:nvPr>
-            <p:ph type="body" idx="3" sz="quarter"/>
+            <p:ph type="body" sz="quarter" idx="3"/>
           </p:nvPr>
         </p:nvSpPr>
         <p:spPr/>
         <p:txBody>
           <a:bodyPr/>
           <a:lstStyle/>
-          <a:p/>
+          <a:p>
+            <a:endParaRPr/>
+          </a:p>
         </p:txBody>
       </p:sp>
       <p:sp>
@@ -1451,7 +1275,7 @@
             <a:spLocks noGrp="1"/>
           </p:cNvSpPr>
           <p:nvPr>
-            <p:ph type="sldNum" idx="5" sz="quarter"/>
+            <p:ph type="sldNum" sz="quarter" idx="5"/>
           </p:nvPr>
         </p:nvSpPr>
         <p:spPr/>
@@ -1465,7 +1289,7 @@
 </file>
 
 <file path=ppt/notesSlides/notesSlide7.xml><?xml version="1.0" encoding="utf-8"?>
-<p:notes xmlns:a="http://schemas.openxmlformats.org/drawingml/2006/main" xmlns:p="http://schemas.openxmlformats.org/presentationml/2006/main" xmlns:r="http://schemas.openxmlformats.org/officeDocument/2006/relationships">
+<p:notes xmlns:a="http://schemas.openxmlformats.org/drawingml/2006/main" xmlns:r="http://schemas.openxmlformats.org/officeDocument/2006/relationships" xmlns:p="http://schemas.openxmlformats.org/presentationml/2006/main">
   <p:cSld>
     <p:spTree>
       <p:nvGrpSpPr>
@@ -1485,7 +1309,7 @@
         <p:nvSpPr>
           <p:cNvPr id="2" name="Slide Image Placeholder 1"/>
           <p:cNvSpPr>
-            <a:spLocks noGrp="1"/>
+            <a:spLocks noGrp="1" noRot="1" noChangeAspect="1"/>
           </p:cNvSpPr>
           <p:nvPr>
             <p:ph type="sldImg" idx="2"/>
@@ -1500,14 +1324,16 @@
             <a:spLocks noGrp="1"/>
           </p:cNvSpPr>
           <p:nvPr>
-            <p:ph type="body" idx="3" sz="quarter"/>
+            <p:ph type="body" sz="quarter" idx="3"/>
           </p:nvPr>
         </p:nvSpPr>
         <p:spPr/>
         <p:txBody>
           <a:bodyPr/>
           <a:lstStyle/>
-          <a:p/>
+          <a:p>
+            <a:endParaRPr/>
+          </a:p>
         </p:txBody>
       </p:sp>
       <p:sp>
@@ -1517,7 +1343,7 @@
             <a:spLocks noGrp="1"/>
           </p:cNvSpPr>
           <p:nvPr>
-            <p:ph type="sldNum" idx="5" sz="quarter"/>
+            <p:ph type="sldNum" sz="quarter" idx="5"/>
           </p:nvPr>
         </p:nvSpPr>
         <p:spPr/>
@@ -1531,7 +1357,7 @@
 </file>
 
 <file path=ppt/notesSlides/notesSlide8.xml><?xml version="1.0" encoding="utf-8"?>
-<p:notes xmlns:a="http://schemas.openxmlformats.org/drawingml/2006/main" xmlns:p="http://schemas.openxmlformats.org/presentationml/2006/main" xmlns:r="http://schemas.openxmlformats.org/officeDocument/2006/relationships">
+<p:notes xmlns:a="http://schemas.openxmlformats.org/drawingml/2006/main" xmlns:r="http://schemas.openxmlformats.org/officeDocument/2006/relationships" xmlns:p="http://schemas.openxmlformats.org/presentationml/2006/main">
   <p:cSld>
     <p:spTree>
       <p:nvGrpSpPr>
@@ -1551,7 +1377,7 @@
         <p:nvSpPr>
           <p:cNvPr id="2" name="Slide Image Placeholder 1"/>
           <p:cNvSpPr>
-            <a:spLocks noGrp="1"/>
+            <a:spLocks noGrp="1" noRot="1" noChangeAspect="1"/>
           </p:cNvSpPr>
           <p:nvPr>
             <p:ph type="sldImg" idx="2"/>
@@ -1566,14 +1392,16 @@
             <a:spLocks noGrp="1"/>
           </p:cNvSpPr>
           <p:nvPr>
-            <p:ph type="body" idx="3" sz="quarter"/>
+            <p:ph type="body" sz="quarter" idx="3"/>
           </p:nvPr>
         </p:nvSpPr>
         <p:spPr/>
         <p:txBody>
           <a:bodyPr/>
           <a:lstStyle/>
-          <a:p/>
+          <a:p>
+            <a:endParaRPr/>
+          </a:p>
         </p:txBody>
       </p:sp>
       <p:sp>
@@ -1583,7 +1411,7 @@
             <a:spLocks noGrp="1"/>
           </p:cNvSpPr>
           <p:nvPr>
-            <p:ph type="sldNum" idx="5" sz="quarter"/>
+            <p:ph type="sldNum" sz="quarter" idx="5"/>
           </p:nvPr>
         </p:nvSpPr>
         <p:spPr/>
@@ -1597,7 +1425,7 @@
 </file>
 
 <file path=ppt/notesSlides/notesSlide9.xml><?xml version="1.0" encoding="utf-8"?>
-<p:notes xmlns:a="http://schemas.openxmlformats.org/drawingml/2006/main" xmlns:p="http://schemas.openxmlformats.org/presentationml/2006/main" xmlns:r="http://schemas.openxmlformats.org/officeDocument/2006/relationships">
+<p:notes xmlns:a="http://schemas.openxmlformats.org/drawingml/2006/main" xmlns:r="http://schemas.openxmlformats.org/officeDocument/2006/relationships" xmlns:p="http://schemas.openxmlformats.org/presentationml/2006/main">
   <p:cSld>
     <p:spTree>
       <p:nvGrpSpPr>
@@ -1617,7 +1445,7 @@
         <p:nvSpPr>
           <p:cNvPr id="2" name="Slide Image Placeholder 1"/>
           <p:cNvSpPr>
-            <a:spLocks noGrp="1"/>
+            <a:spLocks noGrp="1" noRot="1" noChangeAspect="1"/>
           </p:cNvSpPr>
           <p:nvPr>
             <p:ph type="sldImg" idx="2"/>
@@ -1632,14 +1460,16 @@
             <a:spLocks noGrp="1"/>
           </p:cNvSpPr>
           <p:nvPr>
-            <p:ph type="body" idx="3" sz="quarter"/>
+            <p:ph type="body" sz="quarter" idx="3"/>
           </p:nvPr>
         </p:nvSpPr>
         <p:spPr/>
         <p:txBody>
           <a:bodyPr/>
           <a:lstStyle/>
-          <a:p/>
+          <a:p>
+            <a:endParaRPr/>
+          </a:p>
         </p:txBody>
       </p:sp>
       <p:sp>
@@ -1649,7 +1479,7 @@
             <a:spLocks noGrp="1"/>
           </p:cNvSpPr>
           <p:nvPr>
-            <p:ph type="sldNum" idx="5" sz="quarter"/>
+            <p:ph type="sldNum" sz="quarter" idx="5"/>
           </p:nvPr>
         </p:nvSpPr>
         <p:spPr/>
@@ -1700,10 +1530,9 @@
           <a:lstStyle/>
           <a:p>
             <a:r>
-              <a:rPr lang="en-US" smtClean="0"/>
+              <a:rPr lang="en-US"/>
               <a:t>Click to edit Master title style</a:t>
             </a:r>
-            <a:endParaRPr lang="en-US"/>
           </a:p>
         </p:txBody>
       </p:sp>
@@ -1819,10 +1648,9 @@
           </a:lstStyle>
           <a:p>
             <a:r>
-              <a:rPr lang="en-US" smtClean="0"/>
+              <a:rPr lang="en-US"/>
               <a:t>Click to edit Master subtitle style</a:t>
             </a:r>
-            <a:endParaRPr lang="en-US"/>
           </a:p>
         </p:txBody>
       </p:sp>
@@ -1843,7 +1671,7 @@
           <a:p>
             <a:fld id="{5BCAD085-E8A6-8845-BD4E-CB4CCA059FC4}" type="datetimeFigureOut">
               <a:rPr lang="en-US" smtClean="0"/>
-              <a:t>1/27/13</a:t>
+              <a:t>4/27/22</a:t>
             </a:fld>
             <a:endParaRPr lang="en-US"/>
           </a:p>
@@ -1937,10 +1765,9 @@
           <a:lstStyle/>
           <a:p>
             <a:r>
-              <a:rPr lang="en-US" smtClean="0"/>
+              <a:rPr lang="en-US"/>
               <a:t>Click to edit Master title style</a:t>
             </a:r>
-            <a:endParaRPr lang="en-US"/>
           </a:p>
         </p:txBody>
       </p:sp>
@@ -1961,38 +1788,37 @@
           <a:p>
             <a:pPr lvl="0"/>
             <a:r>
-              <a:rPr lang="en-US" smtClean="0"/>
+              <a:rPr lang="en-US"/>
               <a:t>Click to edit Master text styles</a:t>
             </a:r>
           </a:p>
           <a:p>
             <a:pPr lvl="1"/>
             <a:r>
-              <a:rPr lang="en-US" smtClean="0"/>
+              <a:rPr lang="en-US"/>
               <a:t>Second level</a:t>
             </a:r>
           </a:p>
           <a:p>
             <a:pPr lvl="2"/>
             <a:r>
-              <a:rPr lang="en-US" smtClean="0"/>
+              <a:rPr lang="en-US"/>
               <a:t>Third level</a:t>
             </a:r>
           </a:p>
           <a:p>
             <a:pPr lvl="3"/>
             <a:r>
-              <a:rPr lang="en-US" smtClean="0"/>
+              <a:rPr lang="en-US"/>
               <a:t>Fourth level</a:t>
             </a:r>
           </a:p>
           <a:p>
             <a:pPr lvl="4"/>
             <a:r>
-              <a:rPr lang="en-US" smtClean="0"/>
+              <a:rPr lang="en-US"/>
               <a:t>Fifth level</a:t>
             </a:r>
-            <a:endParaRPr lang="en-US"/>
           </a:p>
         </p:txBody>
       </p:sp>
@@ -2013,7 +1839,7 @@
           <a:p>
             <a:fld id="{5BCAD085-E8A6-8845-BD4E-CB4CCA059FC4}" type="datetimeFigureOut">
               <a:rPr lang="en-US" smtClean="0"/>
-              <a:t>1/27/13</a:t>
+              <a:t>4/27/22</a:t>
             </a:fld>
             <a:endParaRPr lang="en-US"/>
           </a:p>
@@ -2112,10 +1938,9 @@
           <a:lstStyle/>
           <a:p>
             <a:r>
-              <a:rPr lang="en-US" smtClean="0"/>
+              <a:rPr lang="en-US"/>
               <a:t>Click to edit Master title style</a:t>
             </a:r>
-            <a:endParaRPr lang="en-US"/>
           </a:p>
         </p:txBody>
       </p:sp>
@@ -2141,38 +1966,37 @@
           <a:p>
             <a:pPr lvl="0"/>
             <a:r>
-              <a:rPr lang="en-US" smtClean="0"/>
+              <a:rPr lang="en-US"/>
               <a:t>Click to edit Master text styles</a:t>
             </a:r>
           </a:p>
           <a:p>
             <a:pPr lvl="1"/>
             <a:r>
-              <a:rPr lang="en-US" smtClean="0"/>
+              <a:rPr lang="en-US"/>
               <a:t>Second level</a:t>
             </a:r>
           </a:p>
           <a:p>
             <a:pPr lvl="2"/>
             <a:r>
-              <a:rPr lang="en-US" smtClean="0"/>
+              <a:rPr lang="en-US"/>
               <a:t>Third level</a:t>
             </a:r>
           </a:p>
           <a:p>
             <a:pPr lvl="3"/>
             <a:r>
-              <a:rPr lang="en-US" smtClean="0"/>
+              <a:rPr lang="en-US"/>
               <a:t>Fourth level</a:t>
             </a:r>
           </a:p>
           <a:p>
             <a:pPr lvl="4"/>
             <a:r>
-              <a:rPr lang="en-US" smtClean="0"/>
+              <a:rPr lang="en-US"/>
               <a:t>Fifth level</a:t>
             </a:r>
-            <a:endParaRPr lang="en-US"/>
           </a:p>
         </p:txBody>
       </p:sp>
@@ -2193,7 +2017,7 @@
           <a:p>
             <a:fld id="{5BCAD085-E8A6-8845-BD4E-CB4CCA059FC4}" type="datetimeFigureOut">
               <a:rPr lang="en-US" smtClean="0"/>
-              <a:t>1/27/13</a:t>
+              <a:t>4/27/22</a:t>
             </a:fld>
             <a:endParaRPr lang="en-US"/>
           </a:p>
@@ -2287,10 +2111,9 @@
           <a:lstStyle/>
           <a:p>
             <a:r>
-              <a:rPr lang="en-US" smtClean="0"/>
+              <a:rPr lang="en-US"/>
               <a:t>Click to edit Master title style</a:t>
             </a:r>
-            <a:endParaRPr lang="en-US"/>
           </a:p>
         </p:txBody>
       </p:sp>
@@ -2311,38 +2134,37 @@
           <a:p>
             <a:pPr lvl="0"/>
             <a:r>
-              <a:rPr lang="en-US" smtClean="0"/>
+              <a:rPr lang="en-US"/>
               <a:t>Click to edit Master text styles</a:t>
             </a:r>
           </a:p>
           <a:p>
             <a:pPr lvl="1"/>
             <a:r>
-              <a:rPr lang="en-US" smtClean="0"/>
+              <a:rPr lang="en-US"/>
               <a:t>Second level</a:t>
             </a:r>
           </a:p>
           <a:p>
             <a:pPr lvl="2"/>
             <a:r>
-              <a:rPr lang="en-US" smtClean="0"/>
+              <a:rPr lang="en-US"/>
               <a:t>Third level</a:t>
             </a:r>
           </a:p>
           <a:p>
             <a:pPr lvl="3"/>
             <a:r>
-              <a:rPr lang="en-US" smtClean="0"/>
+              <a:rPr lang="en-US"/>
               <a:t>Fourth level</a:t>
             </a:r>
           </a:p>
           <a:p>
             <a:pPr lvl="4"/>
             <a:r>
-              <a:rPr lang="en-US" smtClean="0"/>
+              <a:rPr lang="en-US"/>
               <a:t>Fifth level</a:t>
             </a:r>
-            <a:endParaRPr lang="en-US"/>
           </a:p>
         </p:txBody>
       </p:sp>
@@ -2363,7 +2185,7 @@
           <a:p>
             <a:fld id="{5BCAD085-E8A6-8845-BD4E-CB4CCA059FC4}" type="datetimeFigureOut">
               <a:rPr lang="en-US" smtClean="0"/>
-              <a:t>1/27/13</a:t>
+              <a:t>4/27/22</a:t>
             </a:fld>
             <a:endParaRPr lang="en-US"/>
           </a:p>
@@ -2466,10 +2288,9 @@
           </a:lstStyle>
           <a:p>
             <a:r>
-              <a:rPr lang="en-US" smtClean="0"/>
+              <a:rPr lang="en-US"/>
               <a:t>Click to edit Master title style</a:t>
             </a:r>
-            <a:endParaRPr lang="en-US"/>
           </a:p>
         </p:txBody>
       </p:sp>
@@ -2586,7 +2407,7 @@
           <a:p>
             <a:pPr lvl="0"/>
             <a:r>
-              <a:rPr lang="en-US" smtClean="0"/>
+              <a:rPr lang="en-US"/>
               <a:t>Click to edit Master text styles</a:t>
             </a:r>
           </a:p>
@@ -2609,7 +2430,7 @@
           <a:p>
             <a:fld id="{5BCAD085-E8A6-8845-BD4E-CB4CCA059FC4}" type="datetimeFigureOut">
               <a:rPr lang="en-US" smtClean="0"/>
-              <a:t>1/27/13</a:t>
+              <a:t>4/27/22</a:t>
             </a:fld>
             <a:endParaRPr lang="en-US"/>
           </a:p>
@@ -2703,10 +2524,9 @@
           <a:lstStyle/>
           <a:p>
             <a:r>
-              <a:rPr lang="en-US" smtClean="0"/>
+              <a:rPr lang="en-US"/>
               <a:t>Click to edit Master title style</a:t>
             </a:r>
-            <a:endParaRPr lang="en-US"/>
           </a:p>
         </p:txBody>
       </p:sp>
@@ -2760,38 +2580,37 @@
           <a:p>
             <a:pPr lvl="0"/>
             <a:r>
-              <a:rPr lang="en-US" smtClean="0"/>
+              <a:rPr lang="en-US"/>
               <a:t>Click to edit Master text styles</a:t>
             </a:r>
           </a:p>
           <a:p>
             <a:pPr lvl="1"/>
             <a:r>
-              <a:rPr lang="en-US" smtClean="0"/>
+              <a:rPr lang="en-US"/>
               <a:t>Second level</a:t>
             </a:r>
           </a:p>
           <a:p>
             <a:pPr lvl="2"/>
             <a:r>
-              <a:rPr lang="en-US" smtClean="0"/>
+              <a:rPr lang="en-US"/>
               <a:t>Third level</a:t>
             </a:r>
           </a:p>
           <a:p>
             <a:pPr lvl="3"/>
             <a:r>
-              <a:rPr lang="en-US" smtClean="0"/>
+              <a:rPr lang="en-US"/>
               <a:t>Fourth level</a:t>
             </a:r>
           </a:p>
           <a:p>
             <a:pPr lvl="4"/>
             <a:r>
-              <a:rPr lang="en-US" smtClean="0"/>
+              <a:rPr lang="en-US"/>
               <a:t>Fifth level</a:t>
             </a:r>
-            <a:endParaRPr lang="en-US"/>
           </a:p>
         </p:txBody>
       </p:sp>
@@ -2845,38 +2664,37 @@
           <a:p>
             <a:pPr lvl="0"/>
             <a:r>
-              <a:rPr lang="en-US" smtClean="0"/>
+              <a:rPr lang="en-US"/>
               <a:t>Click to edit Master text styles</a:t>
             </a:r>
           </a:p>
           <a:p>
             <a:pPr lvl="1"/>
             <a:r>
-              <a:rPr lang="en-US" smtClean="0"/>
+              <a:rPr lang="en-US"/>
               <a:t>Second level</a:t>
             </a:r>
           </a:p>
           <a:p>
             <a:pPr lvl="2"/>
             <a:r>
-              <a:rPr lang="en-US" smtClean="0"/>
+              <a:rPr lang="en-US"/>
               <a:t>Third level</a:t>
             </a:r>
           </a:p>
           <a:p>
             <a:pPr lvl="3"/>
             <a:r>
-              <a:rPr lang="en-US" smtClean="0"/>
+              <a:rPr lang="en-US"/>
               <a:t>Fourth level</a:t>
             </a:r>
           </a:p>
           <a:p>
             <a:pPr lvl="4"/>
             <a:r>
-              <a:rPr lang="en-US" smtClean="0"/>
+              <a:rPr lang="en-US"/>
               <a:t>Fifth level</a:t>
             </a:r>
-            <a:endParaRPr lang="en-US"/>
           </a:p>
         </p:txBody>
       </p:sp>
@@ -2897,7 +2715,7 @@
           <a:p>
             <a:fld id="{5BCAD085-E8A6-8845-BD4E-CB4CCA059FC4}" type="datetimeFigureOut">
               <a:rPr lang="en-US" smtClean="0"/>
-              <a:t>1/27/13</a:t>
+              <a:t>4/27/22</a:t>
             </a:fld>
             <a:endParaRPr lang="en-US"/>
           </a:p>
@@ -2995,10 +2813,9 @@
           </a:lstStyle>
           <a:p>
             <a:r>
-              <a:rPr lang="en-US" smtClean="0"/>
+              <a:rPr lang="en-US"/>
               <a:t>Click to edit Master title style</a:t>
             </a:r>
-            <a:endParaRPr lang="en-US"/>
           </a:p>
         </p:txBody>
       </p:sp>
@@ -3061,7 +2878,7 @@
           <a:p>
             <a:pPr lvl="0"/>
             <a:r>
-              <a:rPr lang="en-US" smtClean="0"/>
+              <a:rPr lang="en-US"/>
               <a:t>Click to edit Master text styles</a:t>
             </a:r>
           </a:p>
@@ -3117,38 +2934,37 @@
           <a:p>
             <a:pPr lvl="0"/>
             <a:r>
-              <a:rPr lang="en-US" smtClean="0"/>
+              <a:rPr lang="en-US"/>
               <a:t>Click to edit Master text styles</a:t>
             </a:r>
           </a:p>
           <a:p>
             <a:pPr lvl="1"/>
             <a:r>
-              <a:rPr lang="en-US" smtClean="0"/>
+              <a:rPr lang="en-US"/>
               <a:t>Second level</a:t>
             </a:r>
           </a:p>
           <a:p>
             <a:pPr lvl="2"/>
             <a:r>
-              <a:rPr lang="en-US" smtClean="0"/>
+              <a:rPr lang="en-US"/>
               <a:t>Third level</a:t>
             </a:r>
           </a:p>
           <a:p>
             <a:pPr lvl="3"/>
             <a:r>
-              <a:rPr lang="en-US" smtClean="0"/>
+              <a:rPr lang="en-US"/>
               <a:t>Fourth level</a:t>
             </a:r>
           </a:p>
           <a:p>
             <a:pPr lvl="4"/>
             <a:r>
-              <a:rPr lang="en-US" smtClean="0"/>
+              <a:rPr lang="en-US"/>
               <a:t>Fifth level</a:t>
             </a:r>
-            <a:endParaRPr lang="en-US"/>
           </a:p>
         </p:txBody>
       </p:sp>
@@ -3211,7 +3027,7 @@
           <a:p>
             <a:pPr lvl="0"/>
             <a:r>
-              <a:rPr lang="en-US" smtClean="0"/>
+              <a:rPr lang="en-US"/>
               <a:t>Click to edit Master text styles</a:t>
             </a:r>
           </a:p>
@@ -3267,38 +3083,37 @@
           <a:p>
             <a:pPr lvl="0"/>
             <a:r>
-              <a:rPr lang="en-US" smtClean="0"/>
+              <a:rPr lang="en-US"/>
               <a:t>Click to edit Master text styles</a:t>
             </a:r>
           </a:p>
           <a:p>
             <a:pPr lvl="1"/>
             <a:r>
-              <a:rPr lang="en-US" smtClean="0"/>
+              <a:rPr lang="en-US"/>
               <a:t>Second level</a:t>
             </a:r>
           </a:p>
           <a:p>
             <a:pPr lvl="2"/>
             <a:r>
-              <a:rPr lang="en-US" smtClean="0"/>
+              <a:rPr lang="en-US"/>
               <a:t>Third level</a:t>
             </a:r>
           </a:p>
           <a:p>
             <a:pPr lvl="3"/>
             <a:r>
-              <a:rPr lang="en-US" smtClean="0"/>
+              <a:rPr lang="en-US"/>
               <a:t>Fourth level</a:t>
             </a:r>
           </a:p>
           <a:p>
             <a:pPr lvl="4"/>
             <a:r>
-              <a:rPr lang="en-US" smtClean="0"/>
+              <a:rPr lang="en-US"/>
               <a:t>Fifth level</a:t>
             </a:r>
-            <a:endParaRPr lang="en-US"/>
           </a:p>
         </p:txBody>
       </p:sp>
@@ -3319,7 +3134,7 @@
           <a:p>
             <a:fld id="{5BCAD085-E8A6-8845-BD4E-CB4CCA059FC4}" type="datetimeFigureOut">
               <a:rPr lang="en-US" smtClean="0"/>
-              <a:t>1/27/13</a:t>
+              <a:t>4/27/22</a:t>
             </a:fld>
             <a:endParaRPr lang="en-US"/>
           </a:p>
@@ -3413,10 +3228,9 @@
           <a:lstStyle/>
           <a:p>
             <a:r>
-              <a:rPr lang="en-US" smtClean="0"/>
+              <a:rPr lang="en-US"/>
               <a:t>Click to edit Master title style</a:t>
             </a:r>
-            <a:endParaRPr lang="en-US"/>
           </a:p>
         </p:txBody>
       </p:sp>
@@ -3437,7 +3251,7 @@
           <a:p>
             <a:fld id="{5BCAD085-E8A6-8845-BD4E-CB4CCA059FC4}" type="datetimeFigureOut">
               <a:rPr lang="en-US" smtClean="0"/>
-              <a:t>1/27/13</a:t>
+              <a:t>4/27/22</a:t>
             </a:fld>
             <a:endParaRPr lang="en-US"/>
           </a:p>
@@ -3532,7 +3346,7 @@
           <a:p>
             <a:fld id="{5BCAD085-E8A6-8845-BD4E-CB4CCA059FC4}" type="datetimeFigureOut">
               <a:rPr lang="en-US" smtClean="0"/>
-              <a:t>1/27/13</a:t>
+              <a:t>4/27/22</a:t>
             </a:fld>
             <a:endParaRPr lang="en-US"/>
           </a:p>
@@ -3635,10 +3449,9 @@
           </a:lstStyle>
           <a:p>
             <a:r>
-              <a:rPr lang="en-US" smtClean="0"/>
+              <a:rPr lang="en-US"/>
               <a:t>Click to edit Master title style</a:t>
             </a:r>
-            <a:endParaRPr lang="en-US"/>
           </a:p>
         </p:txBody>
       </p:sp>
@@ -3692,38 +3505,37 @@
           <a:p>
             <a:pPr lvl="0"/>
             <a:r>
-              <a:rPr lang="en-US" smtClean="0"/>
+              <a:rPr lang="en-US"/>
               <a:t>Click to edit Master text styles</a:t>
             </a:r>
           </a:p>
           <a:p>
             <a:pPr lvl="1"/>
             <a:r>
-              <a:rPr lang="en-US" smtClean="0"/>
+              <a:rPr lang="en-US"/>
               <a:t>Second level</a:t>
             </a:r>
           </a:p>
           <a:p>
             <a:pPr lvl="2"/>
             <a:r>
-              <a:rPr lang="en-US" smtClean="0"/>
+              <a:rPr lang="en-US"/>
               <a:t>Third level</a:t>
             </a:r>
           </a:p>
           <a:p>
             <a:pPr lvl="3"/>
             <a:r>
-              <a:rPr lang="en-US" smtClean="0"/>
+              <a:rPr lang="en-US"/>
               <a:t>Fourth level</a:t>
             </a:r>
           </a:p>
           <a:p>
             <a:pPr lvl="4"/>
             <a:r>
-              <a:rPr lang="en-US" smtClean="0"/>
+              <a:rPr lang="en-US"/>
               <a:t>Fifth level</a:t>
             </a:r>
-            <a:endParaRPr lang="en-US"/>
           </a:p>
         </p:txBody>
       </p:sp>
@@ -3786,7 +3598,7 @@
           <a:p>
             <a:pPr lvl="0"/>
             <a:r>
-              <a:rPr lang="en-US" smtClean="0"/>
+              <a:rPr lang="en-US"/>
               <a:t>Click to edit Master text styles</a:t>
             </a:r>
           </a:p>
@@ -3809,7 +3621,7 @@
           <a:p>
             <a:fld id="{5BCAD085-E8A6-8845-BD4E-CB4CCA059FC4}" type="datetimeFigureOut">
               <a:rPr lang="en-US" smtClean="0"/>
-              <a:t>1/27/13</a:t>
+              <a:t>4/27/22</a:t>
             </a:fld>
             <a:endParaRPr lang="en-US"/>
           </a:p>
@@ -3912,10 +3724,9 @@
           </a:lstStyle>
           <a:p>
             <a:r>
-              <a:rPr lang="en-US" smtClean="0"/>
+              <a:rPr lang="en-US"/>
               <a:t>Click to edit Master title style</a:t>
             </a:r>
-            <a:endParaRPr lang="en-US"/>
           </a:p>
         </p:txBody>
       </p:sp>
@@ -4039,7 +3850,7 @@
           <a:p>
             <a:pPr lvl="0"/>
             <a:r>
-              <a:rPr lang="en-US" smtClean="0"/>
+              <a:rPr lang="en-US"/>
               <a:t>Click to edit Master text styles</a:t>
             </a:r>
           </a:p>
@@ -4062,7 +3873,7 @@
           <a:p>
             <a:fld id="{5BCAD085-E8A6-8845-BD4E-CB4CCA059FC4}" type="datetimeFigureOut">
               <a:rPr lang="en-US" smtClean="0"/>
-              <a:t>1/27/13</a:t>
+              <a:t>4/27/22</a:t>
             </a:fld>
             <a:endParaRPr lang="en-US"/>
           </a:p>
@@ -4171,10 +3982,9 @@
           <a:lstStyle/>
           <a:p>
             <a:r>
-              <a:rPr lang="en-US" smtClean="0"/>
+              <a:rPr lang="en-US"/>
               <a:t>Click to edit Master title style</a:t>
             </a:r>
-            <a:endParaRPr lang="en-US"/>
           </a:p>
         </p:txBody>
       </p:sp>
@@ -4205,38 +4015,37 @@
           <a:p>
             <a:pPr lvl="0"/>
             <a:r>
-              <a:rPr lang="en-US" smtClean="0"/>
+              <a:rPr lang="en-US"/>
               <a:t>Click to edit Master text styles</a:t>
             </a:r>
           </a:p>
           <a:p>
             <a:pPr lvl="1"/>
             <a:r>
-              <a:rPr lang="en-US" smtClean="0"/>
+              <a:rPr lang="en-US"/>
               <a:t>Second level</a:t>
             </a:r>
           </a:p>
           <a:p>
             <a:pPr lvl="2"/>
             <a:r>
-              <a:rPr lang="en-US" smtClean="0"/>
+              <a:rPr lang="en-US"/>
               <a:t>Third level</a:t>
             </a:r>
           </a:p>
           <a:p>
             <a:pPr lvl="3"/>
             <a:r>
-              <a:rPr lang="en-US" smtClean="0"/>
+              <a:rPr lang="en-US"/>
               <a:t>Fourth level</a:t>
             </a:r>
           </a:p>
           <a:p>
             <a:pPr lvl="4"/>
             <a:r>
-              <a:rPr lang="en-US" smtClean="0"/>
+              <a:rPr lang="en-US"/>
               <a:t>Fifth level</a:t>
             </a:r>
-            <a:endParaRPr lang="en-US"/>
           </a:p>
         </p:txBody>
       </p:sp>
@@ -4275,7 +4084,7 @@
           <a:p>
             <a:fld id="{5BCAD085-E8A6-8845-BD4E-CB4CCA059FC4}" type="datetimeFigureOut">
               <a:rPr lang="en-US" smtClean="0"/>
-              <a:t>1/27/13</a:t>
+              <a:t>4/27/22</a:t>
             </a:fld>
             <a:endParaRPr lang="en-US"/>
           </a:p>
@@ -4634,7 +4443,7 @@
 </file>
 
 <file path=ppt/slides/slide1.xml><?xml version="1.0" encoding="utf-8"?>
-<p:sld xmlns:a="http://schemas.openxmlformats.org/drawingml/2006/main" xmlns:p="http://schemas.openxmlformats.org/presentationml/2006/main" xmlns:r="http://schemas.openxmlformats.org/officeDocument/2006/relationships">
+<p:sld xmlns:a="http://schemas.openxmlformats.org/drawingml/2006/main" xmlns:r="http://schemas.openxmlformats.org/officeDocument/2006/relationships" xmlns:p="http://schemas.openxmlformats.org/presentationml/2006/main">
   <p:cSld>
     <p:spTree>
       <p:nvGrpSpPr>
@@ -4642,7 +4451,14 @@
         <p:cNvGrpSpPr/>
         <p:nvPr/>
       </p:nvGrpSpPr>
-      <p:grpSpPr/>
+      <p:grpSpPr>
+        <a:xfrm>
+          <a:off x="0" y="0"/>
+          <a:ext cx="0" cy="0"/>
+          <a:chOff x="0" y="0"/>
+          <a:chExt cx="0" cy="0"/>
+        </a:xfrm>
+      </p:grpSpPr>
       <p:pic>
         <p:nvPicPr>
           <p:cNvPr id="2" name="450974505_2431653396_223132457.mp4">
@@ -4652,10 +4468,10 @@
             <a:picLocks noChangeAspect="1"/>
           </p:cNvPicPr>
           <p:nvPr>
-            <a:videoFile r:link="rId4"/>
+            <a:videoFile r:link="rId2"/>
             <p:extLst>
               <p:ext uri="{DAA4B4D4-6D71-4841-9C94-3DE7FCFB9230}">
-                <p14:media xmlns:p14="http://schemas.microsoft.com/office/powerpoint/2010/main" r:embed="rId3"/>
+                <p14:media xmlns:p14="http://schemas.microsoft.com/office/powerpoint/2010/main" r:embed="rId1"/>
               </p:ext>
             </p:extLst>
           </p:nvPr>
@@ -4801,7 +4617,7 @@
 </file>
 
 <file path=ppt/slides/slide10.xml><?xml version="1.0" encoding="utf-8"?>
-<p:sld xmlns:a="http://schemas.openxmlformats.org/drawingml/2006/main" xmlns:p="http://schemas.openxmlformats.org/presentationml/2006/main" xmlns:r="http://schemas.openxmlformats.org/officeDocument/2006/relationships">
+<p:sld xmlns:a="http://schemas.openxmlformats.org/drawingml/2006/main" xmlns:r="http://schemas.openxmlformats.org/officeDocument/2006/relationships" xmlns:p="http://schemas.openxmlformats.org/presentationml/2006/main">
   <p:cSld>
     <p:spTree>
       <p:nvGrpSpPr>
@@ -4809,7 +4625,14 @@
         <p:cNvGrpSpPr/>
         <p:nvPr/>
       </p:nvGrpSpPr>
-      <p:grpSpPr/>
+      <p:grpSpPr>
+        <a:xfrm>
+          <a:off x="0" y="0"/>
+          <a:ext cx="0" cy="0"/>
+          <a:chOff x="0" y="0"/>
+          <a:chExt cx="0" cy="0"/>
+        </a:xfrm>
+      </p:grpSpPr>
       <p:pic>
         <p:nvPicPr>
           <p:cNvPr id="2" name="34786186_3058548180_561117714.mp4">
@@ -4819,10 +4642,10 @@
             <a:picLocks noChangeAspect="1"/>
           </p:cNvPicPr>
           <p:nvPr>
-            <a:videoFile r:link="rId4"/>
+            <a:videoFile r:link="rId2"/>
             <p:extLst>
               <p:ext uri="{DAA4B4D4-6D71-4841-9C94-3DE7FCFB9230}">
-                <p14:media xmlns:p14="http://schemas.microsoft.com/office/powerpoint/2010/main" r:embed="rId3"/>
+                <p14:media xmlns:p14="http://schemas.microsoft.com/office/powerpoint/2010/main" r:embed="rId1"/>
               </p:ext>
             </p:extLst>
           </p:nvPr>
@@ -4968,7 +4791,7 @@
 </file>
 
 <file path=ppt/slides/slide11.xml><?xml version="1.0" encoding="utf-8"?>
-<p:sld xmlns:a="http://schemas.openxmlformats.org/drawingml/2006/main" xmlns:p="http://schemas.openxmlformats.org/presentationml/2006/main" xmlns:r="http://schemas.openxmlformats.org/officeDocument/2006/relationships">
+<p:sld xmlns:a="http://schemas.openxmlformats.org/drawingml/2006/main" xmlns:r="http://schemas.openxmlformats.org/officeDocument/2006/relationships" xmlns:p="http://schemas.openxmlformats.org/presentationml/2006/main">
   <p:cSld>
     <p:spTree>
       <p:nvGrpSpPr>
@@ -4976,7 +4799,14 @@
         <p:cNvGrpSpPr/>
         <p:nvPr/>
       </p:nvGrpSpPr>
-      <p:grpSpPr/>
+      <p:grpSpPr>
+        <a:xfrm>
+          <a:off x="0" y="0"/>
+          <a:ext cx="0" cy="0"/>
+          <a:chOff x="0" y="0"/>
+          <a:chExt cx="0" cy="0"/>
+        </a:xfrm>
+      </p:grpSpPr>
       <p:pic>
         <p:nvPicPr>
           <p:cNvPr id="2" name="34786186_3605373372_619606884.mp4">
@@ -4986,10 +4816,10 @@
             <a:picLocks noChangeAspect="1"/>
           </p:cNvPicPr>
           <p:nvPr>
-            <a:videoFile r:link="rId4"/>
+            <a:videoFile r:link="rId2"/>
             <p:extLst>
               <p:ext uri="{DAA4B4D4-6D71-4841-9C94-3DE7FCFB9230}">
-                <p14:media xmlns:p14="http://schemas.microsoft.com/office/powerpoint/2010/main" r:embed="rId3"/>
+                <p14:media xmlns:p14="http://schemas.microsoft.com/office/powerpoint/2010/main" r:embed="rId1"/>
               </p:ext>
             </p:extLst>
           </p:nvPr>
@@ -5135,7 +4965,7 @@
 </file>
 
 <file path=ppt/slides/slide12.xml><?xml version="1.0" encoding="utf-8"?>
-<p:sld xmlns:a="http://schemas.openxmlformats.org/drawingml/2006/main" xmlns:p="http://schemas.openxmlformats.org/presentationml/2006/main" xmlns:r="http://schemas.openxmlformats.org/officeDocument/2006/relationships">
+<p:sld xmlns:a="http://schemas.openxmlformats.org/drawingml/2006/main" xmlns:r="http://schemas.openxmlformats.org/officeDocument/2006/relationships" xmlns:p="http://schemas.openxmlformats.org/presentationml/2006/main">
   <p:cSld>
     <p:spTree>
       <p:nvGrpSpPr>
@@ -5143,7 +4973,14 @@
         <p:cNvGrpSpPr/>
         <p:nvPr/>
       </p:nvGrpSpPr>
-      <p:grpSpPr/>
+      <p:grpSpPr>
+        <a:xfrm>
+          <a:off x="0" y="0"/>
+          <a:ext cx="0" cy="0"/>
+          <a:chOff x="0" y="0"/>
+          <a:chExt cx="0" cy="0"/>
+        </a:xfrm>
+      </p:grpSpPr>
       <p:pic>
         <p:nvPicPr>
           <p:cNvPr id="2" name="34786186_461246473_289365302.mp4">
@@ -5153,10 +4990,10 @@
             <a:picLocks noChangeAspect="1"/>
           </p:cNvPicPr>
           <p:nvPr>
-            <a:videoFile r:link="rId4"/>
+            <a:videoFile r:link="rId2"/>
             <p:extLst>
               <p:ext uri="{DAA4B4D4-6D71-4841-9C94-3DE7FCFB9230}">
-                <p14:media xmlns:p14="http://schemas.microsoft.com/office/powerpoint/2010/main" r:embed="rId3"/>
+                <p14:media xmlns:p14="http://schemas.microsoft.com/office/powerpoint/2010/main" r:embed="rId1"/>
               </p:ext>
             </p:extLst>
           </p:nvPr>
@@ -5302,7 +5139,7 @@
 </file>
 
 <file path=ppt/slides/slide13.xml><?xml version="1.0" encoding="utf-8"?>
-<p:sld xmlns:a="http://schemas.openxmlformats.org/drawingml/2006/main" xmlns:p="http://schemas.openxmlformats.org/presentationml/2006/main" xmlns:r="http://schemas.openxmlformats.org/officeDocument/2006/relationships">
+<p:sld xmlns:a="http://schemas.openxmlformats.org/drawingml/2006/main" xmlns:r="http://schemas.openxmlformats.org/officeDocument/2006/relationships" xmlns:p="http://schemas.openxmlformats.org/presentationml/2006/main">
   <p:cSld>
     <p:spTree>
       <p:nvGrpSpPr>
@@ -5310,7 +5147,14 @@
         <p:cNvGrpSpPr/>
         <p:nvPr/>
       </p:nvGrpSpPr>
-      <p:grpSpPr/>
+      <p:grpSpPr>
+        <a:xfrm>
+          <a:off x="0" y="0"/>
+          <a:ext cx="0" cy="0"/>
+          <a:chOff x="0" y="0"/>
+          <a:chExt cx="0" cy="0"/>
+        </a:xfrm>
+      </p:grpSpPr>
       <p:pic>
         <p:nvPicPr>
           <p:cNvPr id="2" name="34786186_1113700294_1942589434.mp4">
@@ -5320,10 +5164,10 @@
             <a:picLocks noChangeAspect="1"/>
           </p:cNvPicPr>
           <p:nvPr>
-            <a:videoFile r:link="rId4"/>
+            <a:videoFile r:link="rId2"/>
             <p:extLst>
               <p:ext uri="{DAA4B4D4-6D71-4841-9C94-3DE7FCFB9230}">
-                <p14:media xmlns:p14="http://schemas.microsoft.com/office/powerpoint/2010/main" r:embed="rId3"/>
+                <p14:media xmlns:p14="http://schemas.microsoft.com/office/powerpoint/2010/main" r:embed="rId1"/>
               </p:ext>
             </p:extLst>
           </p:nvPr>
@@ -5469,7 +5313,7 @@
 </file>
 
 <file path=ppt/slides/slide14.xml><?xml version="1.0" encoding="utf-8"?>
-<p:sld xmlns:a="http://schemas.openxmlformats.org/drawingml/2006/main" xmlns:p="http://schemas.openxmlformats.org/presentationml/2006/main" xmlns:r="http://schemas.openxmlformats.org/officeDocument/2006/relationships">
+<p:sld xmlns:a="http://schemas.openxmlformats.org/drawingml/2006/main" xmlns:r="http://schemas.openxmlformats.org/officeDocument/2006/relationships" xmlns:p="http://schemas.openxmlformats.org/presentationml/2006/main">
   <p:cSld>
     <p:spTree>
       <p:nvGrpSpPr>
@@ -5477,7 +5321,14 @@
         <p:cNvGrpSpPr/>
         <p:nvPr/>
       </p:nvGrpSpPr>
-      <p:grpSpPr/>
+      <p:grpSpPr>
+        <a:xfrm>
+          <a:off x="0" y="0"/>
+          <a:ext cx="0" cy="0"/>
+          <a:chOff x="0" y="0"/>
+          <a:chExt cx="0" cy="0"/>
+        </a:xfrm>
+      </p:grpSpPr>
       <p:pic>
         <p:nvPicPr>
           <p:cNvPr id="2" name="34786186_447288125_753752511.mp4">
@@ -5487,10 +5338,10 @@
             <a:picLocks noChangeAspect="1"/>
           </p:cNvPicPr>
           <p:nvPr>
-            <a:videoFile r:link="rId4"/>
+            <a:videoFile r:link="rId2"/>
             <p:extLst>
               <p:ext uri="{DAA4B4D4-6D71-4841-9C94-3DE7FCFB9230}">
-                <p14:media xmlns:p14="http://schemas.microsoft.com/office/powerpoint/2010/main" r:embed="rId3"/>
+                <p14:media xmlns:p14="http://schemas.microsoft.com/office/powerpoint/2010/main" r:embed="rId1"/>
               </p:ext>
             </p:extLst>
           </p:nvPr>
@@ -5636,7 +5487,7 @@
 </file>
 
 <file path=ppt/slides/slide15.xml><?xml version="1.0" encoding="utf-8"?>
-<p:sld xmlns:a="http://schemas.openxmlformats.org/drawingml/2006/main" xmlns:p="http://schemas.openxmlformats.org/presentationml/2006/main" xmlns:r="http://schemas.openxmlformats.org/officeDocument/2006/relationships">
+<p:sld xmlns:a="http://schemas.openxmlformats.org/drawingml/2006/main" xmlns:r="http://schemas.openxmlformats.org/officeDocument/2006/relationships" xmlns:p="http://schemas.openxmlformats.org/presentationml/2006/main">
   <p:cSld>
     <p:spTree>
       <p:nvGrpSpPr>
@@ -5644,7 +5495,14 @@
         <p:cNvGrpSpPr/>
         <p:nvPr/>
       </p:nvGrpSpPr>
-      <p:grpSpPr/>
+      <p:grpSpPr>
+        <a:xfrm>
+          <a:off x="0" y="0"/>
+          <a:ext cx="0" cy="0"/>
+          <a:chOff x="0" y="0"/>
+          <a:chExt cx="0" cy="0"/>
+        </a:xfrm>
+      </p:grpSpPr>
       <p:pic>
         <p:nvPicPr>
           <p:cNvPr id="2" name="34786186_3852586544_1407641982.mp4">
@@ -5654,10 +5512,10 @@
             <a:picLocks noChangeAspect="1"/>
           </p:cNvPicPr>
           <p:nvPr>
-            <a:videoFile r:link="rId4"/>
+            <a:videoFile r:link="rId2"/>
             <p:extLst>
               <p:ext uri="{DAA4B4D4-6D71-4841-9C94-3DE7FCFB9230}">
-                <p14:media xmlns:p14="http://schemas.microsoft.com/office/powerpoint/2010/main" r:embed="rId3"/>
+                <p14:media xmlns:p14="http://schemas.microsoft.com/office/powerpoint/2010/main" r:embed="rId1"/>
               </p:ext>
             </p:extLst>
           </p:nvPr>
@@ -5803,7 +5661,7 @@
 </file>
 
 <file path=ppt/slides/slide16.xml><?xml version="1.0" encoding="utf-8"?>
-<p:sld xmlns:a="http://schemas.openxmlformats.org/drawingml/2006/main" xmlns:p="http://schemas.openxmlformats.org/presentationml/2006/main" xmlns:r="http://schemas.openxmlformats.org/officeDocument/2006/relationships">
+<p:sld xmlns:a="http://schemas.openxmlformats.org/drawingml/2006/main" xmlns:r="http://schemas.openxmlformats.org/officeDocument/2006/relationships" xmlns:p="http://schemas.openxmlformats.org/presentationml/2006/main">
   <p:cSld>
     <p:spTree>
       <p:nvGrpSpPr>
@@ -5811,7 +5669,14 @@
         <p:cNvGrpSpPr/>
         <p:nvPr/>
       </p:nvGrpSpPr>
-      <p:grpSpPr/>
+      <p:grpSpPr>
+        <a:xfrm>
+          <a:off x="0" y="0"/>
+          <a:ext cx="0" cy="0"/>
+          <a:chOff x="0" y="0"/>
+          <a:chExt cx="0" cy="0"/>
+        </a:xfrm>
+      </p:grpSpPr>
       <p:pic>
         <p:nvPicPr>
           <p:cNvPr id="2" name="34786186_396089475_640178694.mp4">
@@ -5821,10 +5686,10 @@
             <a:picLocks noChangeAspect="1"/>
           </p:cNvPicPr>
           <p:nvPr>
-            <a:videoFile r:link="rId4"/>
+            <a:videoFile r:link="rId2"/>
             <p:extLst>
               <p:ext uri="{DAA4B4D4-6D71-4841-9C94-3DE7FCFB9230}">
-                <p14:media xmlns:p14="http://schemas.microsoft.com/office/powerpoint/2010/main" r:embed="rId3"/>
+                <p14:media xmlns:p14="http://schemas.microsoft.com/office/powerpoint/2010/main" r:embed="rId1"/>
               </p:ext>
             </p:extLst>
           </p:nvPr>
@@ -5970,7 +5835,7 @@
 </file>
 
 <file path=ppt/slides/slide17.xml><?xml version="1.0" encoding="utf-8"?>
-<p:sld xmlns:a="http://schemas.openxmlformats.org/drawingml/2006/main" xmlns:p="http://schemas.openxmlformats.org/presentationml/2006/main" xmlns:r="http://schemas.openxmlformats.org/officeDocument/2006/relationships">
+<p:sld xmlns:a="http://schemas.openxmlformats.org/drawingml/2006/main" xmlns:r="http://schemas.openxmlformats.org/officeDocument/2006/relationships" xmlns:p="http://schemas.openxmlformats.org/presentationml/2006/main">
   <p:cSld>
     <p:spTree>
       <p:nvGrpSpPr>
@@ -5978,7 +5843,14 @@
         <p:cNvGrpSpPr/>
         <p:nvPr/>
       </p:nvGrpSpPr>
-      <p:grpSpPr/>
+      <p:grpSpPr>
+        <a:xfrm>
+          <a:off x="0" y="0"/>
+          <a:ext cx="0" cy="0"/>
+          <a:chOff x="0" y="0"/>
+          <a:chExt cx="0" cy="0"/>
+        </a:xfrm>
+      </p:grpSpPr>
       <p:pic>
         <p:nvPicPr>
           <p:cNvPr id="2" name="34786186_3079661351_3563073421.mp4">
@@ -5988,10 +5860,10 @@
             <a:picLocks noChangeAspect="1"/>
           </p:cNvPicPr>
           <p:nvPr>
-            <a:videoFile r:link="rId4"/>
+            <a:videoFile r:link="rId2"/>
             <p:extLst>
               <p:ext uri="{DAA4B4D4-6D71-4841-9C94-3DE7FCFB9230}">
-                <p14:media xmlns:p14="http://schemas.microsoft.com/office/powerpoint/2010/main" r:embed="rId3"/>
+                <p14:media xmlns:p14="http://schemas.microsoft.com/office/powerpoint/2010/main" r:embed="rId1"/>
               </p:ext>
             </p:extLst>
           </p:nvPr>
@@ -6137,7 +6009,7 @@
 </file>
 
 <file path=ppt/slides/slide18.xml><?xml version="1.0" encoding="utf-8"?>
-<p:sld xmlns:a="http://schemas.openxmlformats.org/drawingml/2006/main" xmlns:p="http://schemas.openxmlformats.org/presentationml/2006/main" xmlns:r="http://schemas.openxmlformats.org/officeDocument/2006/relationships">
+<p:sld xmlns:a="http://schemas.openxmlformats.org/drawingml/2006/main" xmlns:r="http://schemas.openxmlformats.org/officeDocument/2006/relationships" xmlns:p="http://schemas.openxmlformats.org/presentationml/2006/main">
   <p:cSld>
     <p:spTree>
       <p:nvGrpSpPr>
@@ -6145,7 +6017,14 @@
         <p:cNvGrpSpPr/>
         <p:nvPr/>
       </p:nvGrpSpPr>
-      <p:grpSpPr/>
+      <p:grpSpPr>
+        <a:xfrm>
+          <a:off x="0" y="0"/>
+          <a:ext cx="0" cy="0"/>
+          <a:chOff x="0" y="0"/>
+          <a:chExt cx="0" cy="0"/>
+        </a:xfrm>
+      </p:grpSpPr>
       <p:pic>
         <p:nvPicPr>
           <p:cNvPr id="2" name="34786186_1873162817_84583644.mp4">
@@ -6155,10 +6034,10 @@
             <a:picLocks noChangeAspect="1"/>
           </p:cNvPicPr>
           <p:nvPr>
-            <a:videoFile r:link="rId4"/>
+            <a:videoFile r:link="rId2"/>
             <p:extLst>
               <p:ext uri="{DAA4B4D4-6D71-4841-9C94-3DE7FCFB9230}">
-                <p14:media xmlns:p14="http://schemas.microsoft.com/office/powerpoint/2010/main" r:embed="rId3"/>
+                <p14:media xmlns:p14="http://schemas.microsoft.com/office/powerpoint/2010/main" r:embed="rId1"/>
               </p:ext>
             </p:extLst>
           </p:nvPr>
@@ -6304,7 +6183,7 @@
 </file>
 
 <file path=ppt/slides/slide2.xml><?xml version="1.0" encoding="utf-8"?>
-<p:sld xmlns:a="http://schemas.openxmlformats.org/drawingml/2006/main" xmlns:p="http://schemas.openxmlformats.org/presentationml/2006/main" xmlns:r="http://schemas.openxmlformats.org/officeDocument/2006/relationships">
+<p:sld xmlns:a="http://schemas.openxmlformats.org/drawingml/2006/main" xmlns:r="http://schemas.openxmlformats.org/officeDocument/2006/relationships" xmlns:p="http://schemas.openxmlformats.org/presentationml/2006/main">
   <p:cSld>
     <p:spTree>
       <p:nvGrpSpPr>
@@ -6312,7 +6191,14 @@
         <p:cNvGrpSpPr/>
         <p:nvPr/>
       </p:nvGrpSpPr>
-      <p:grpSpPr/>
+      <p:grpSpPr>
+        <a:xfrm>
+          <a:off x="0" y="0"/>
+          <a:ext cx="0" cy="0"/>
+          <a:chOff x="0" y="0"/>
+          <a:chExt cx="0" cy="0"/>
+        </a:xfrm>
+      </p:grpSpPr>
       <p:pic>
         <p:nvPicPr>
           <p:cNvPr id="2" name="34786186_1437549814_4126343452.mp4">
@@ -6322,10 +6208,10 @@
             <a:picLocks noChangeAspect="1"/>
           </p:cNvPicPr>
           <p:nvPr>
-            <a:videoFile r:link="rId4"/>
+            <a:videoFile r:link="rId2"/>
             <p:extLst>
               <p:ext uri="{DAA4B4D4-6D71-4841-9C94-3DE7FCFB9230}">
-                <p14:media xmlns:p14="http://schemas.microsoft.com/office/powerpoint/2010/main" r:embed="rId3"/>
+                <p14:media xmlns:p14="http://schemas.microsoft.com/office/powerpoint/2010/main" r:embed="rId1"/>
               </p:ext>
             </p:extLst>
           </p:nvPr>
@@ -6471,7 +6357,7 @@
 </file>
 
 <file path=ppt/slides/slide3.xml><?xml version="1.0" encoding="utf-8"?>
-<p:sld xmlns:a="http://schemas.openxmlformats.org/drawingml/2006/main" xmlns:p="http://schemas.openxmlformats.org/presentationml/2006/main" xmlns:r="http://schemas.openxmlformats.org/officeDocument/2006/relationships">
+<p:sld xmlns:a="http://schemas.openxmlformats.org/drawingml/2006/main" xmlns:r="http://schemas.openxmlformats.org/officeDocument/2006/relationships" xmlns:p="http://schemas.openxmlformats.org/presentationml/2006/main">
   <p:cSld>
     <p:spTree>
       <p:nvGrpSpPr>
@@ -6479,7 +6365,14 @@
         <p:cNvGrpSpPr/>
         <p:nvPr/>
       </p:nvGrpSpPr>
-      <p:grpSpPr/>
+      <p:grpSpPr>
+        <a:xfrm>
+          <a:off x="0" y="0"/>
+          <a:ext cx="0" cy="0"/>
+          <a:chOff x="0" y="0"/>
+          <a:chExt cx="0" cy="0"/>
+        </a:xfrm>
+      </p:grpSpPr>
       <p:pic>
         <p:nvPicPr>
           <p:cNvPr id="2" name="34786186_1832738720_223132457.mp4">
@@ -6489,10 +6382,10 @@
             <a:picLocks noChangeAspect="1"/>
           </p:cNvPicPr>
           <p:nvPr>
-            <a:videoFile r:link="rId4"/>
+            <a:videoFile r:link="rId2"/>
             <p:extLst>
               <p:ext uri="{DAA4B4D4-6D71-4841-9C94-3DE7FCFB9230}">
-                <p14:media xmlns:p14="http://schemas.microsoft.com/office/powerpoint/2010/main" r:embed="rId3"/>
+                <p14:media xmlns:p14="http://schemas.microsoft.com/office/powerpoint/2010/main" r:embed="rId1"/>
               </p:ext>
             </p:extLst>
           </p:nvPr>
@@ -6507,6 +6400,66 @@
           <a:xfrm>
             <a:off x="0" y="0"/>
             <a:ext cx="18288000" cy="10287000"/>
+          </a:xfrm>
+          <a:prstGeom prst="rect">
+            <a:avLst/>
+          </a:prstGeom>
+        </p:spPr>
+      </p:pic>
+      <p:pic>
+        <p:nvPicPr>
+          <p:cNvPr id="4" name="Picture 3">
+            <a:extLst>
+              <a:ext uri="{FF2B5EF4-FFF2-40B4-BE49-F238E27FC236}">
+                <a16:creationId xmlns:a16="http://schemas.microsoft.com/office/drawing/2014/main" id="{B0B5786F-BD1B-FC62-C9CC-B309881044FA}"/>
+              </a:ext>
+            </a:extLst>
+          </p:cNvPr>
+          <p:cNvPicPr>
+            <a:picLocks noChangeAspect="1"/>
+          </p:cNvPicPr>
+          <p:nvPr/>
+        </p:nvPicPr>
+        <p:blipFill>
+          <a:blip r:embed="rId6"/>
+          <a:stretch>
+            <a:fillRect/>
+          </a:stretch>
+        </p:blipFill>
+        <p:spPr>
+          <a:xfrm>
+            <a:off x="10986329" y="1540041"/>
+            <a:ext cx="4718892" cy="7084630"/>
+          </a:xfrm>
+          <a:prstGeom prst="rect">
+            <a:avLst/>
+          </a:prstGeom>
+        </p:spPr>
+      </p:pic>
+      <p:pic>
+        <p:nvPicPr>
+          <p:cNvPr id="6" name="Picture 5">
+            <a:extLst>
+              <a:ext uri="{FF2B5EF4-FFF2-40B4-BE49-F238E27FC236}">
+                <a16:creationId xmlns:a16="http://schemas.microsoft.com/office/drawing/2014/main" id="{9B7389F2-DAEE-1026-E8DD-971F874EEAA0}"/>
+              </a:ext>
+            </a:extLst>
+          </p:cNvPr>
+          <p:cNvPicPr>
+            <a:picLocks noChangeAspect="1"/>
+          </p:cNvPicPr>
+          <p:nvPr/>
+        </p:nvPicPr>
+        <p:blipFill>
+          <a:blip r:embed="rId7"/>
+          <a:stretch>
+            <a:fillRect/>
+          </a:stretch>
+        </p:blipFill>
+        <p:spPr>
+          <a:xfrm>
+            <a:off x="2304653" y="1683399"/>
+            <a:ext cx="4320735" cy="6920202"/>
           </a:xfrm>
           <a:prstGeom prst="rect">
             <a:avLst/>
@@ -6542,20 +6495,81 @@
                             </p:stCondLst>
                             <p:childTnLst>
                               <p:par>
-                                <p:cTn id="5" presetID="1" presetClass="entr" presetSubtype="0" fill="hold" nodeType="withEffect">
+                                <p:cTn id="5" presetID="1" presetClass="mediacall" presetSubtype="0" fill="hold" nodeType="afterEffect">
+                                  <p:stCondLst>
+                                    <p:cond delay="0"/>
+                                  </p:stCondLst>
+                                  <p:childTnLst>
+                                    <p:cmd type="call" cmd="playFrom(0.0)">
+                                      <p:cBhvr>
+                                        <p:cTn id="6" dur="1000" fill="hold"/>
+                                        <p:tgtEl>
+                                          <p:spTgt spid="2"/>
+                                        </p:tgtEl>
+                                      </p:cBhvr>
+                                    </p:cmd>
+                                  </p:childTnLst>
+                                </p:cTn>
+                              </p:par>
+                            </p:childTnLst>
+                          </p:cTn>
+                        </p:par>
+                      </p:childTnLst>
+                    </p:cTn>
+                  </p:par>
+                  <p:par>
+                    <p:cTn id="7" fill="hold">
+                      <p:stCondLst>
+                        <p:cond delay="indefinite"/>
+                      </p:stCondLst>
+                      <p:childTnLst>
+                        <p:par>
+                          <p:cTn id="8" fill="hold">
+                            <p:stCondLst>
+                              <p:cond delay="0"/>
+                            </p:stCondLst>
+                            <p:childTnLst>
+                              <p:par>
+                                <p:cTn id="9" presetID="1" presetClass="mediacall" presetSubtype="0" fill="hold" nodeType="clickEffect">
+                                  <p:stCondLst>
+                                    <p:cond delay="0"/>
+                                  </p:stCondLst>
+                                  <p:childTnLst>
+                                    <p:cmd type="call" cmd="playFrom(0.0)">
+                                      <p:cBhvr>
+                                        <p:cTn id="10" dur="1000" fill="hold"/>
+                                        <p:tgtEl>
+                                          <p:spTgt spid="2"/>
+                                        </p:tgtEl>
+                                      </p:cBhvr>
+                                    </p:cmd>
+                                  </p:childTnLst>
+                                </p:cTn>
+                              </p:par>
+                            </p:childTnLst>
+                          </p:cTn>
+                        </p:par>
+                        <p:par>
+                          <p:cTn id="11" fill="hold">
+                            <p:stCondLst>
+                              <p:cond delay="1000"/>
+                            </p:stCondLst>
+                            <p:childTnLst>
+                              <p:par>
+                                <p:cTn id="12" presetID="1" presetClass="entr" presetSubtype="0" fill="hold" nodeType="afterEffect">
                                   <p:stCondLst>
                                     <p:cond delay="0"/>
                                   </p:stCondLst>
                                   <p:childTnLst>
                                     <p:set>
                                       <p:cBhvr>
-                                        <p:cTn id="6" dur="1" fill="hold">
+                                        <p:cTn id="13" dur="1" fill="hold">
                                           <p:stCondLst>
                                             <p:cond delay="0"/>
                                           </p:stCondLst>
                                         </p:cTn>
                                         <p:tgtEl>
-                                          <p:spTgt spid="2"/>
+                                          <p:spTgt spid="6"/>
                                         </p:tgtEl>
                                         <p:attrNameLst>
                                           <p:attrName>style.visibility</p:attrName>
@@ -6571,26 +6585,45 @@
                             </p:childTnLst>
                           </p:cTn>
                         </p:par>
+                      </p:childTnLst>
+                    </p:cTn>
+                  </p:par>
+                  <p:par>
+                    <p:cTn id="14" fill="hold">
+                      <p:stCondLst>
+                        <p:cond delay="indefinite"/>
+                      </p:stCondLst>
+                      <p:childTnLst>
                         <p:par>
-                          <p:cTn id="7" fill="hold">
+                          <p:cTn id="15" fill="hold">
                             <p:stCondLst>
                               <p:cond delay="0"/>
                             </p:stCondLst>
                             <p:childTnLst>
                               <p:par>
-                                <p:cTn id="8" presetID="1" presetClass="mediacall" presetSubtype="0" fill="hold" nodeType="afterEffect">
+                                <p:cTn id="16" presetID="1" presetClass="entr" presetSubtype="0" fill="hold" nodeType="clickEffect">
                                   <p:stCondLst>
                                     <p:cond delay="0"/>
                                   </p:stCondLst>
                                   <p:childTnLst>
-                                    <p:cmd type="call" cmd="playFrom(0.0)">
+                                    <p:set>
                                       <p:cBhvr>
-                                        <p:cTn id="9" dur="1000" fill="hold"/>
+                                        <p:cTn id="17" dur="1" fill="hold">
+                                          <p:stCondLst>
+                                            <p:cond delay="0"/>
+                                          </p:stCondLst>
+                                        </p:cTn>
                                         <p:tgtEl>
-                                          <p:spTgt spid="2"/>
+                                          <p:spTgt spid="4"/>
                                         </p:tgtEl>
+                                        <p:attrNameLst>
+                                          <p:attrName>style.visibility</p:attrName>
+                                        </p:attrNameLst>
                                       </p:cBhvr>
-                                    </p:cmd>
+                                      <p:to>
+                                        <p:strVal val="visible"/>
+                                      </p:to>
+                                    </p:set>
                                   </p:childTnLst>
                                 </p:cTn>
                               </p:par>
@@ -6619,7 +6652,7 @@
             </p:seq>
             <p:video>
               <p:cMediaNode vol="80000">
-                <p:cTn id="10" fill="hold" display="0">
+                <p:cTn id="18" fill="hold" display="0">
                   <p:stCondLst>
                     <p:cond delay="indefinite"/>
                   </p:stCondLst>
@@ -6638,7 +6671,7 @@
 </file>
 
 <file path=ppt/slides/slide4.xml><?xml version="1.0" encoding="utf-8"?>
-<p:sld xmlns:a="http://schemas.openxmlformats.org/drawingml/2006/main" xmlns:p="http://schemas.openxmlformats.org/presentationml/2006/main" xmlns:r="http://schemas.openxmlformats.org/officeDocument/2006/relationships">
+<p:sld xmlns:a="http://schemas.openxmlformats.org/drawingml/2006/main" xmlns:r="http://schemas.openxmlformats.org/officeDocument/2006/relationships" xmlns:p="http://schemas.openxmlformats.org/presentationml/2006/main">
   <p:cSld>
     <p:spTree>
       <p:nvGrpSpPr>
@@ -6646,7 +6679,14 @@
         <p:cNvGrpSpPr/>
         <p:nvPr/>
       </p:nvGrpSpPr>
-      <p:grpSpPr/>
+      <p:grpSpPr>
+        <a:xfrm>
+          <a:off x="0" y="0"/>
+          <a:ext cx="0" cy="0"/>
+          <a:chOff x="0" y="0"/>
+          <a:chExt cx="0" cy="0"/>
+        </a:xfrm>
+      </p:grpSpPr>
       <p:pic>
         <p:nvPicPr>
           <p:cNvPr id="2" name="34786186_318158393_3780824801.mp4">
@@ -6656,10 +6696,10 @@
             <a:picLocks noChangeAspect="1"/>
           </p:cNvPicPr>
           <p:nvPr>
-            <a:videoFile r:link="rId4"/>
+            <a:videoFile r:link="rId2"/>
             <p:extLst>
               <p:ext uri="{DAA4B4D4-6D71-4841-9C94-3DE7FCFB9230}">
-                <p14:media xmlns:p14="http://schemas.microsoft.com/office/powerpoint/2010/main" r:embed="rId3"/>
+                <p14:media xmlns:p14="http://schemas.microsoft.com/office/powerpoint/2010/main" r:embed="rId1"/>
               </p:ext>
             </p:extLst>
           </p:nvPr>
@@ -6805,7 +6845,7 @@
 </file>
 
 <file path=ppt/slides/slide5.xml><?xml version="1.0" encoding="utf-8"?>
-<p:sld xmlns:a="http://schemas.openxmlformats.org/drawingml/2006/main" xmlns:p="http://schemas.openxmlformats.org/presentationml/2006/main" xmlns:r="http://schemas.openxmlformats.org/officeDocument/2006/relationships">
+<p:sld xmlns:a="http://schemas.openxmlformats.org/drawingml/2006/main" xmlns:r="http://schemas.openxmlformats.org/officeDocument/2006/relationships" xmlns:p="http://schemas.openxmlformats.org/presentationml/2006/main">
   <p:cSld>
     <p:spTree>
       <p:nvGrpSpPr>
@@ -6813,7 +6853,14 @@
         <p:cNvGrpSpPr/>
         <p:nvPr/>
       </p:nvGrpSpPr>
-      <p:grpSpPr/>
+      <p:grpSpPr>
+        <a:xfrm>
+          <a:off x="0" y="0"/>
+          <a:ext cx="0" cy="0"/>
+          <a:chOff x="0" y="0"/>
+          <a:chExt cx="0" cy="0"/>
+        </a:xfrm>
+      </p:grpSpPr>
       <p:pic>
         <p:nvPicPr>
           <p:cNvPr id="2" name="34786186_1307075908_844859006.mp4">
@@ -6823,16 +6870,16 @@
             <a:picLocks noChangeAspect="1"/>
           </p:cNvPicPr>
           <p:nvPr>
-            <a:videoFile r:link="rId4"/>
+            <a:videoFile r:link="rId2"/>
             <p:extLst>
               <p:ext uri="{DAA4B4D4-6D71-4841-9C94-3DE7FCFB9230}">
-                <p14:media xmlns:p14="http://schemas.microsoft.com/office/powerpoint/2010/main" r:embed="rId3"/>
+                <p14:media xmlns:p14="http://schemas.microsoft.com/office/powerpoint/2010/main" r:embed="rId1"/>
               </p:ext>
             </p:extLst>
           </p:nvPr>
         </p:nvPicPr>
         <p:blipFill>
-          <a:blip r:embed="rId5"/>
+          <a:blip r:embed="rId7"/>
           <a:stretch>
             <a:fillRect/>
           </a:stretch>
@@ -6856,10 +6903,10 @@
             <a:picLocks noChangeAspect="1"/>
           </p:cNvPicPr>
           <p:nvPr>
-            <a:videoFile r:link="rId7"/>
+            <a:videoFile r:link="rId4"/>
             <p:extLst>
               <p:ext uri="{DAA4B4D4-6D71-4841-9C94-3DE7FCFB9230}">
-                <p14:media xmlns:p14="http://schemas.microsoft.com/office/powerpoint/2010/main" r:embed="rId6"/>
+                <p14:media xmlns:p14="http://schemas.microsoft.com/office/powerpoint/2010/main" r:embed="rId3"/>
               </p:ext>
             </p:extLst>
           </p:nvPr>
@@ -7127,7 +7174,7 @@
 </file>
 
 <file path=ppt/slides/slide6.xml><?xml version="1.0" encoding="utf-8"?>
-<p:sld xmlns:a="http://schemas.openxmlformats.org/drawingml/2006/main" xmlns:p="http://schemas.openxmlformats.org/presentationml/2006/main" xmlns:r="http://schemas.openxmlformats.org/officeDocument/2006/relationships">
+<p:sld xmlns:a="http://schemas.openxmlformats.org/drawingml/2006/main" xmlns:r="http://schemas.openxmlformats.org/officeDocument/2006/relationships" xmlns:p="http://schemas.openxmlformats.org/presentationml/2006/main">
   <p:cSld>
     <p:spTree>
       <p:nvGrpSpPr>
@@ -7135,7 +7182,14 @@
         <p:cNvGrpSpPr/>
         <p:nvPr/>
       </p:nvGrpSpPr>
-      <p:grpSpPr/>
+      <p:grpSpPr>
+        <a:xfrm>
+          <a:off x="0" y="0"/>
+          <a:ext cx="0" cy="0"/>
+          <a:chOff x="0" y="0"/>
+          <a:chExt cx="0" cy="0"/>
+        </a:xfrm>
+      </p:grpSpPr>
       <p:pic>
         <p:nvPicPr>
           <p:cNvPr id="2" name="34786186_417518097_637748599.mp4">
@@ -7145,16 +7199,16 @@
             <a:picLocks noChangeAspect="1"/>
           </p:cNvPicPr>
           <p:nvPr>
-            <a:videoFile r:link="rId4"/>
+            <a:videoFile r:link="rId2"/>
             <p:extLst>
               <p:ext uri="{DAA4B4D4-6D71-4841-9C94-3DE7FCFB9230}">
-                <p14:media xmlns:p14="http://schemas.microsoft.com/office/powerpoint/2010/main" r:embed="rId3"/>
+                <p14:media xmlns:p14="http://schemas.microsoft.com/office/powerpoint/2010/main" r:embed="rId1"/>
               </p:ext>
             </p:extLst>
           </p:nvPr>
         </p:nvPicPr>
         <p:blipFill>
-          <a:blip r:embed="rId5"/>
+          <a:blip r:embed="rId7"/>
           <a:stretch>
             <a:fillRect/>
           </a:stretch>
@@ -7178,10 +7232,10 @@
             <a:picLocks noChangeAspect="1"/>
           </p:cNvPicPr>
           <p:nvPr>
-            <a:videoFile r:link="rId7"/>
+            <a:videoFile r:link="rId4"/>
             <p:extLst>
               <p:ext uri="{DAA4B4D4-6D71-4841-9C94-3DE7FCFB9230}">
-                <p14:media xmlns:p14="http://schemas.microsoft.com/office/powerpoint/2010/main" r:embed="rId6"/>
+                <p14:media xmlns:p14="http://schemas.microsoft.com/office/powerpoint/2010/main" r:embed="rId3"/>
               </p:ext>
             </p:extLst>
           </p:nvPr>
@@ -7449,7 +7503,7 @@
 </file>
 
 <file path=ppt/slides/slide7.xml><?xml version="1.0" encoding="utf-8"?>
-<p:sld xmlns:a="http://schemas.openxmlformats.org/drawingml/2006/main" xmlns:p="http://schemas.openxmlformats.org/presentationml/2006/main" xmlns:r="http://schemas.openxmlformats.org/officeDocument/2006/relationships">
+<p:sld xmlns:a="http://schemas.openxmlformats.org/drawingml/2006/main" xmlns:r="http://schemas.openxmlformats.org/officeDocument/2006/relationships" xmlns:p="http://schemas.openxmlformats.org/presentationml/2006/main">
   <p:cSld>
     <p:spTree>
       <p:nvGrpSpPr>
@@ -7457,7 +7511,14 @@
         <p:cNvGrpSpPr/>
         <p:nvPr/>
       </p:nvGrpSpPr>
-      <p:grpSpPr/>
+      <p:grpSpPr>
+        <a:xfrm>
+          <a:off x="0" y="0"/>
+          <a:ext cx="0" cy="0"/>
+          <a:chOff x="0" y="0"/>
+          <a:chExt cx="0" cy="0"/>
+        </a:xfrm>
+      </p:grpSpPr>
       <p:pic>
         <p:nvPicPr>
           <p:cNvPr id="2" name="34786186_3360432911_3662324290.mp4">
@@ -7467,10 +7528,10 @@
             <a:picLocks noChangeAspect="1"/>
           </p:cNvPicPr>
           <p:nvPr>
-            <a:videoFile r:link="rId4"/>
+            <a:videoFile r:link="rId2"/>
             <p:extLst>
               <p:ext uri="{DAA4B4D4-6D71-4841-9C94-3DE7FCFB9230}">
-                <p14:media xmlns:p14="http://schemas.microsoft.com/office/powerpoint/2010/main" r:embed="rId3"/>
+                <p14:media xmlns:p14="http://schemas.microsoft.com/office/powerpoint/2010/main" r:embed="rId1"/>
               </p:ext>
             </p:extLst>
           </p:nvPr>
@@ -7616,7 +7677,7 @@
 </file>
 
 <file path=ppt/slides/slide8.xml><?xml version="1.0" encoding="utf-8"?>
-<p:sld xmlns:a="http://schemas.openxmlformats.org/drawingml/2006/main" xmlns:p="http://schemas.openxmlformats.org/presentationml/2006/main" xmlns:r="http://schemas.openxmlformats.org/officeDocument/2006/relationships">
+<p:sld xmlns:a="http://schemas.openxmlformats.org/drawingml/2006/main" xmlns:r="http://schemas.openxmlformats.org/officeDocument/2006/relationships" xmlns:p="http://schemas.openxmlformats.org/presentationml/2006/main">
   <p:cSld>
     <p:spTree>
       <p:nvGrpSpPr>
@@ -7624,7 +7685,14 @@
         <p:cNvGrpSpPr/>
         <p:nvPr/>
       </p:nvGrpSpPr>
-      <p:grpSpPr/>
+      <p:grpSpPr>
+        <a:xfrm>
+          <a:off x="0" y="0"/>
+          <a:ext cx="0" cy="0"/>
+          <a:chOff x="0" y="0"/>
+          <a:chExt cx="0" cy="0"/>
+        </a:xfrm>
+      </p:grpSpPr>
       <p:pic>
         <p:nvPicPr>
           <p:cNvPr id="2" name="34786186_1019095079_3082365739.mp4">
@@ -7634,10 +7702,10 @@
             <a:picLocks noChangeAspect="1"/>
           </p:cNvPicPr>
           <p:nvPr>
-            <a:videoFile r:link="rId4"/>
+            <a:videoFile r:link="rId2"/>
             <p:extLst>
               <p:ext uri="{DAA4B4D4-6D71-4841-9C94-3DE7FCFB9230}">
-                <p14:media xmlns:p14="http://schemas.microsoft.com/office/powerpoint/2010/main" r:embed="rId3"/>
+                <p14:media xmlns:p14="http://schemas.microsoft.com/office/powerpoint/2010/main" r:embed="rId1"/>
               </p:ext>
             </p:extLst>
           </p:nvPr>
@@ -7783,7 +7851,7 @@
 </file>
 
 <file path=ppt/slides/slide9.xml><?xml version="1.0" encoding="utf-8"?>
-<p:sld xmlns:a="http://schemas.openxmlformats.org/drawingml/2006/main" xmlns:p="http://schemas.openxmlformats.org/presentationml/2006/main" xmlns:r="http://schemas.openxmlformats.org/officeDocument/2006/relationships">
+<p:sld xmlns:a="http://schemas.openxmlformats.org/drawingml/2006/main" xmlns:r="http://schemas.openxmlformats.org/officeDocument/2006/relationships" xmlns:p="http://schemas.openxmlformats.org/presentationml/2006/main">
   <p:cSld>
     <p:spTree>
       <p:nvGrpSpPr>
@@ -7791,7 +7859,14 @@
         <p:cNvGrpSpPr/>
         <p:nvPr/>
       </p:nvGrpSpPr>
-      <p:grpSpPr/>
+      <p:grpSpPr>
+        <a:xfrm>
+          <a:off x="0" y="0"/>
+          <a:ext cx="0" cy="0"/>
+          <a:chOff x="0" y="0"/>
+          <a:chExt cx="0" cy="0"/>
+        </a:xfrm>
+      </p:grpSpPr>
       <p:pic>
         <p:nvPicPr>
           <p:cNvPr id="2" name="34786186_606070520_4019794568.mp4">
@@ -7801,10 +7876,10 @@
             <a:picLocks noChangeAspect="1"/>
           </p:cNvPicPr>
           <p:nvPr>
-            <a:videoFile r:link="rId4"/>
+            <a:videoFile r:link="rId2"/>
             <p:extLst>
               <p:ext uri="{DAA4B4D4-6D71-4841-9C94-3DE7FCFB9230}">
-                <p14:media xmlns:p14="http://schemas.microsoft.com/office/powerpoint/2010/main" r:embed="rId3"/>
+                <p14:media xmlns:p14="http://schemas.microsoft.com/office/powerpoint/2010/main" r:embed="rId1"/>
               </p:ext>
             </p:extLst>
           </p:nvPr>
@@ -8280,44 +8355,44 @@
         <a:sysClr val="window" lastClr="FFFFFF"/>
       </a:lt1>
       <a:dk2>
-        <a:srgbClr val="1F497D"/>
+        <a:srgbClr val="44546A"/>
       </a:dk2>
       <a:lt2>
-        <a:srgbClr val="EEECE1"/>
+        <a:srgbClr val="E7E6E6"/>
       </a:lt2>
       <a:accent1>
-        <a:srgbClr val="4F81BD"/>
+        <a:srgbClr val="4472C4"/>
       </a:accent1>
       <a:accent2>
-        <a:srgbClr val="C0504D"/>
+        <a:srgbClr val="ED7D31"/>
       </a:accent2>
       <a:accent3>
-        <a:srgbClr val="9BBB59"/>
+        <a:srgbClr val="A5A5A5"/>
       </a:accent3>
       <a:accent4>
-        <a:srgbClr val="8064A2"/>
+        <a:srgbClr val="FFC000"/>
       </a:accent4>
       <a:accent5>
-        <a:srgbClr val="4BACC6"/>
+        <a:srgbClr val="5B9BD5"/>
       </a:accent5>
       <a:accent6>
-        <a:srgbClr val="F79646"/>
+        <a:srgbClr val="70AD47"/>
       </a:accent6>
       <a:hlink>
-        <a:srgbClr val="0000FF"/>
+        <a:srgbClr val="0563C1"/>
       </a:hlink>
       <a:folHlink>
-        <a:srgbClr val="800080"/>
+        <a:srgbClr val="954F72"/>
       </a:folHlink>
     </a:clrScheme>
     <a:fontScheme name="Office">
       <a:majorFont>
-        <a:latin typeface="Calibri"/>
+        <a:latin typeface="Calibri Light" panose="020F0302020204030204"/>
         <a:ea typeface=""/>
         <a:cs typeface=""/>
-        <a:font script="Jpan" typeface="ＭＳ Ｐゴシック"/>
+        <a:font script="Jpan" typeface="游ゴシック Light"/>
         <a:font script="Hang" typeface="맑은 고딕"/>
-        <a:font script="Hans" typeface="宋体"/>
+        <a:font script="Hans" typeface="等线 Light"/>
         <a:font script="Hant" typeface="新細明體"/>
         <a:font script="Arab" typeface="Times New Roman"/>
         <a:font script="Hebr" typeface="Times New Roman"/>
@@ -8345,14 +8420,31 @@
         <a:font script="Viet" typeface="Times New Roman"/>
         <a:font script="Uigh" typeface="Microsoft Uighur"/>
         <a:font script="Geor" typeface="Sylfaen"/>
+        <a:font script="Armn" typeface="Arial"/>
+        <a:font script="Bugi" typeface="Leelawadee UI"/>
+        <a:font script="Bopo" typeface="Microsoft JhengHei"/>
+        <a:font script="Java" typeface="Javanese Text"/>
+        <a:font script="Lisu" typeface="Segoe UI"/>
+        <a:font script="Mymr" typeface="Myanmar Text"/>
+        <a:font script="Nkoo" typeface="Ebrima"/>
+        <a:font script="Olck" typeface="Nirmala UI"/>
+        <a:font script="Osma" typeface="Ebrima"/>
+        <a:font script="Phag" typeface="Phagspa"/>
+        <a:font script="Syrn" typeface="Estrangelo Edessa"/>
+        <a:font script="Syrj" typeface="Estrangelo Edessa"/>
+        <a:font script="Syre" typeface="Estrangelo Edessa"/>
+        <a:font script="Sora" typeface="Nirmala UI"/>
+        <a:font script="Tale" typeface="Microsoft Tai Le"/>
+        <a:font script="Talu" typeface="Microsoft New Tai Lue"/>
+        <a:font script="Tfng" typeface="Ebrima"/>
       </a:majorFont>
       <a:minorFont>
-        <a:latin typeface="Calibri"/>
+        <a:latin typeface="Calibri" panose="020F0502020204030204"/>
         <a:ea typeface=""/>
         <a:cs typeface=""/>
-        <a:font script="Jpan" typeface="ＭＳ Ｐゴシック"/>
+        <a:font script="Jpan" typeface="游ゴシック"/>
         <a:font script="Hang" typeface="맑은 고딕"/>
-        <a:font script="Hans" typeface="宋体"/>
+        <a:font script="Hans" typeface="等线"/>
         <a:font script="Hant" typeface="新細明體"/>
         <a:font script="Arab" typeface="Arial"/>
         <a:font script="Hebr" typeface="Arial"/>
@@ -8380,6 +8472,23 @@
         <a:font script="Viet" typeface="Arial"/>
         <a:font script="Uigh" typeface="Microsoft Uighur"/>
         <a:font script="Geor" typeface="Sylfaen"/>
+        <a:font script="Armn" typeface="Arial"/>
+        <a:font script="Bugi" typeface="Leelawadee UI"/>
+        <a:font script="Bopo" typeface="Microsoft JhengHei"/>
+        <a:font script="Java" typeface="Javanese Text"/>
+        <a:font script="Lisu" typeface="Segoe UI"/>
+        <a:font script="Mymr" typeface="Myanmar Text"/>
+        <a:font script="Nkoo" typeface="Ebrima"/>
+        <a:font script="Olck" typeface="Nirmala UI"/>
+        <a:font script="Osma" typeface="Ebrima"/>
+        <a:font script="Phag" typeface="Phagspa"/>
+        <a:font script="Syrn" typeface="Estrangelo Edessa"/>
+        <a:font script="Syrj" typeface="Estrangelo Edessa"/>
+        <a:font script="Syre" typeface="Estrangelo Edessa"/>
+        <a:font script="Sora" typeface="Nirmala UI"/>
+        <a:font script="Tale" typeface="Microsoft Tai Le"/>
+        <a:font script="Talu" typeface="Microsoft New Tai Lue"/>
+        <a:font script="Tfng" typeface="Ebrima"/>
       </a:minorFont>
     </a:fontScheme>
     <a:fmtScheme name="Office">
@@ -8391,200 +8500,141 @@
           <a:gsLst>
             <a:gs pos="0">
               <a:schemeClr val="phClr">
-                <a:tint val="50000"/>
-                <a:satMod val="300000"/>
+                <a:lumMod val="110000"/>
+                <a:satMod val="105000"/>
+                <a:tint val="67000"/>
               </a:schemeClr>
             </a:gs>
-            <a:gs pos="35000">
+            <a:gs pos="50000">
               <a:schemeClr val="phClr">
-                <a:tint val="37000"/>
-                <a:satMod val="300000"/>
+                <a:lumMod val="105000"/>
+                <a:satMod val="103000"/>
+                <a:tint val="73000"/>
               </a:schemeClr>
             </a:gs>
             <a:gs pos="100000">
               <a:schemeClr val="phClr">
-                <a:tint val="15000"/>
-                <a:satMod val="350000"/>
+                <a:lumMod val="105000"/>
+                <a:satMod val="109000"/>
+                <a:tint val="81000"/>
               </a:schemeClr>
             </a:gs>
           </a:gsLst>
-          <a:lin ang="16200000" scaled="1"/>
+          <a:lin ang="5400000" scaled="0"/>
         </a:gradFill>
         <a:gradFill rotWithShape="1">
           <a:gsLst>
             <a:gs pos="0">
               <a:schemeClr val="phClr">
-                <a:tint val="100000"/>
+                <a:satMod val="103000"/>
+                <a:lumMod val="102000"/>
+                <a:tint val="94000"/>
+              </a:schemeClr>
+            </a:gs>
+            <a:gs pos="50000">
+              <a:schemeClr val="phClr">
+                <a:satMod val="110000"/>
+                <a:lumMod val="100000"/>
                 <a:shade val="100000"/>
-                <a:satMod val="130000"/>
               </a:schemeClr>
             </a:gs>
             <a:gs pos="100000">
               <a:schemeClr val="phClr">
-                <a:tint val="50000"/>
-                <a:shade val="100000"/>
-                <a:satMod val="350000"/>
+                <a:lumMod val="99000"/>
+                <a:satMod val="120000"/>
+                <a:shade val="78000"/>
               </a:schemeClr>
             </a:gs>
           </a:gsLst>
-          <a:lin ang="16200000" scaled="0"/>
+          <a:lin ang="5400000" scaled="0"/>
         </a:gradFill>
       </a:fillStyleLst>
       <a:lnStyleLst>
-        <a:ln w="9525" cap="flat" cmpd="sng" algn="ctr">
-          <a:solidFill>
-            <a:schemeClr val="phClr">
-              <a:shade val="95000"/>
-              <a:satMod val="105000"/>
-            </a:schemeClr>
-          </a:solidFill>
-          <a:prstDash val="solid"/>
-        </a:ln>
-        <a:ln w="25400" cap="flat" cmpd="sng" algn="ctr">
+        <a:ln w="6350" cap="flat" cmpd="sng" algn="ctr">
           <a:solidFill>
             <a:schemeClr val="phClr"/>
           </a:solidFill>
           <a:prstDash val="solid"/>
+          <a:miter lim="800000"/>
         </a:ln>
-        <a:ln w="38100" cap="flat" cmpd="sng" algn="ctr">
+        <a:ln w="12700" cap="flat" cmpd="sng" algn="ctr">
           <a:solidFill>
             <a:schemeClr val="phClr"/>
           </a:solidFill>
           <a:prstDash val="solid"/>
+          <a:miter lim="800000"/>
+        </a:ln>
+        <a:ln w="19050" cap="flat" cmpd="sng" algn="ctr">
+          <a:solidFill>
+            <a:schemeClr val="phClr"/>
+          </a:solidFill>
+          <a:prstDash val="solid"/>
+          <a:miter lim="800000"/>
         </a:ln>
       </a:lnStyleLst>
       <a:effectStyleLst>
         <a:effectStyle>
+          <a:effectLst/>
+        </a:effectStyle>
+        <a:effectStyle>
+          <a:effectLst/>
+        </a:effectStyle>
+        <a:effectStyle>
           <a:effectLst>
-            <a:outerShdw blurRad="40000" dist="20000" dir="5400000" rotWithShape="0">
+            <a:outerShdw blurRad="57150" dist="19050" dir="5400000" algn="ctr" rotWithShape="0">
               <a:srgbClr val="000000">
-                <a:alpha val="38000"/>
+                <a:alpha val="63000"/>
               </a:srgbClr>
             </a:outerShdw>
           </a:effectLst>
-        </a:effectStyle>
-        <a:effectStyle>
-          <a:effectLst>
-            <a:outerShdw blurRad="40000" dist="23000" dir="5400000" rotWithShape="0">
-              <a:srgbClr val="000000">
-                <a:alpha val="35000"/>
-              </a:srgbClr>
-            </a:outerShdw>
-          </a:effectLst>
-        </a:effectStyle>
-        <a:effectStyle>
-          <a:effectLst>
-            <a:outerShdw blurRad="40000" dist="23000" dir="5400000" rotWithShape="0">
-              <a:srgbClr val="000000">
-                <a:alpha val="35000"/>
-              </a:srgbClr>
-            </a:outerShdw>
-          </a:effectLst>
-          <a:scene3d>
-            <a:camera prst="orthographicFront">
-              <a:rot lat="0" lon="0" rev="0"/>
-            </a:camera>
-            <a:lightRig rig="threePt" dir="t">
-              <a:rot lat="0" lon="0" rev="1200000"/>
-            </a:lightRig>
-          </a:scene3d>
-          <a:sp3d>
-            <a:bevelT w="63500" h="25400"/>
-          </a:sp3d>
         </a:effectStyle>
       </a:effectStyleLst>
       <a:bgFillStyleLst>
         <a:solidFill>
           <a:schemeClr val="phClr"/>
         </a:solidFill>
+        <a:solidFill>
+          <a:schemeClr val="phClr">
+            <a:tint val="95000"/>
+            <a:satMod val="170000"/>
+          </a:schemeClr>
+        </a:solidFill>
         <a:gradFill rotWithShape="1">
           <a:gsLst>
             <a:gs pos="0">
               <a:schemeClr val="phClr">
-                <a:tint val="40000"/>
-                <a:satMod val="350000"/>
+                <a:tint val="93000"/>
+                <a:satMod val="150000"/>
+                <a:shade val="98000"/>
+                <a:lumMod val="102000"/>
               </a:schemeClr>
             </a:gs>
-            <a:gs pos="40000">
+            <a:gs pos="50000">
               <a:schemeClr val="phClr">
-                <a:tint val="45000"/>
-                <a:shade val="99000"/>
-                <a:satMod val="350000"/>
+                <a:tint val="98000"/>
+                <a:satMod val="130000"/>
+                <a:shade val="90000"/>
+                <a:lumMod val="103000"/>
               </a:schemeClr>
             </a:gs>
             <a:gs pos="100000">
               <a:schemeClr val="phClr">
-                <a:shade val="20000"/>
-                <a:satMod val="255000"/>
+                <a:shade val="63000"/>
+                <a:satMod val="120000"/>
               </a:schemeClr>
             </a:gs>
           </a:gsLst>
-          <a:path path="circle">
-            <a:fillToRect l="50000" t="-80000" r="50000" b="180000"/>
-          </a:path>
-        </a:gradFill>
-        <a:gradFill rotWithShape="1">
-          <a:gsLst>
-            <a:gs pos="0">
-              <a:schemeClr val="phClr">
-                <a:tint val="80000"/>
-                <a:satMod val="300000"/>
-              </a:schemeClr>
-            </a:gs>
-            <a:gs pos="100000">
-              <a:schemeClr val="phClr">
-                <a:shade val="30000"/>
-                <a:satMod val="200000"/>
-              </a:schemeClr>
-            </a:gs>
-          </a:gsLst>
-          <a:path path="circle">
-            <a:fillToRect l="50000" t="50000" r="50000" b="50000"/>
-          </a:path>
+          <a:lin ang="5400000" scaled="0"/>
         </a:gradFill>
       </a:bgFillStyleLst>
     </a:fmtScheme>
   </a:themeElements>
-  <a:objectDefaults>
-    <a:spDef>
-      <a:spPr/>
-      <a:bodyPr/>
-      <a:lstStyle/>
-      <a:style>
-        <a:lnRef idx="1">
-          <a:schemeClr val="accent1"/>
-        </a:lnRef>
-        <a:fillRef idx="3">
-          <a:schemeClr val="accent1"/>
-        </a:fillRef>
-        <a:effectRef idx="2">
-          <a:schemeClr val="accent1"/>
-        </a:effectRef>
-        <a:fontRef idx="minor">
-          <a:schemeClr val="lt1"/>
-        </a:fontRef>
-      </a:style>
-    </a:spDef>
-    <a:lnDef>
-      <a:spPr/>
-      <a:bodyPr/>
-      <a:lstStyle/>
-      <a:style>
-        <a:lnRef idx="2">
-          <a:schemeClr val="accent1"/>
-        </a:lnRef>
-        <a:fillRef idx="0">
-          <a:schemeClr val="accent1"/>
-        </a:fillRef>
-        <a:effectRef idx="1">
-          <a:schemeClr val="accent1"/>
-        </a:effectRef>
-        <a:fontRef idx="minor">
-          <a:schemeClr val="tx1"/>
-        </a:fontRef>
-      </a:style>
-    </a:lnDef>
-  </a:objectDefaults>
+  <a:objectDefaults/>
   <a:extraClrSchemeLst/>
+  <a:extLst>
+    <a:ext uri="{05A4C25C-085E-4340-85A3-A5531E510DB2}">
+      <thm15:themeFamily xmlns:thm15="http://schemas.microsoft.com/office/thememl/2012/main" name="Office Theme" id="{62F939B6-93AF-4DB8-9C6B-D6C7DFDC589F}" vid="{4A3C46E8-61CC-4603-A589-7422A47A8E4A}"/>
+    </a:ext>
+  </a:extLst>
 </a:theme>
 </file>
</xml_diff>